<commit_message>
Made some final adjustments and fixes to documentation files
</commit_message>
<xml_diff>
--- a/Documentatie/presentation/surf.pptx
+++ b/Documentatie/presentation/surf.pptx
@@ -5,7 +5,7 @@
     <p:sldMasterId id="2147483723" r:id="rId1"/>
   </p:sldMasterIdLst>
   <p:notesMasterIdLst>
-    <p:notesMasterId r:id="rId35"/>
+    <p:notesMasterId r:id="rId36"/>
   </p:notesMasterIdLst>
   <p:sldIdLst>
     <p:sldId id="256" r:id="rId2"/>
@@ -21,26 +21,27 @@
     <p:sldId id="266" r:id="rId12"/>
     <p:sldId id="267" r:id="rId13"/>
     <p:sldId id="268" r:id="rId14"/>
-    <p:sldId id="271" r:id="rId15"/>
-    <p:sldId id="272" r:id="rId16"/>
-    <p:sldId id="273" r:id="rId17"/>
-    <p:sldId id="275" r:id="rId18"/>
-    <p:sldId id="269" r:id="rId19"/>
-    <p:sldId id="277" r:id="rId20"/>
-    <p:sldId id="276" r:id="rId21"/>
-    <p:sldId id="278" r:id="rId22"/>
-    <p:sldId id="274" r:id="rId23"/>
-    <p:sldId id="280" r:id="rId24"/>
-    <p:sldId id="279" r:id="rId25"/>
-    <p:sldId id="281" r:id="rId26"/>
-    <p:sldId id="282" r:id="rId27"/>
-    <p:sldId id="283" r:id="rId28"/>
-    <p:sldId id="284" r:id="rId29"/>
-    <p:sldId id="285" r:id="rId30"/>
-    <p:sldId id="286" r:id="rId31"/>
-    <p:sldId id="287" r:id="rId32"/>
-    <p:sldId id="288" r:id="rId33"/>
-    <p:sldId id="289" r:id="rId34"/>
+    <p:sldId id="290" r:id="rId15"/>
+    <p:sldId id="271" r:id="rId16"/>
+    <p:sldId id="272" r:id="rId17"/>
+    <p:sldId id="273" r:id="rId18"/>
+    <p:sldId id="275" r:id="rId19"/>
+    <p:sldId id="269" r:id="rId20"/>
+    <p:sldId id="277" r:id="rId21"/>
+    <p:sldId id="276" r:id="rId22"/>
+    <p:sldId id="278" r:id="rId23"/>
+    <p:sldId id="274" r:id="rId24"/>
+    <p:sldId id="280" r:id="rId25"/>
+    <p:sldId id="279" r:id="rId26"/>
+    <p:sldId id="281" r:id="rId27"/>
+    <p:sldId id="282" r:id="rId28"/>
+    <p:sldId id="283" r:id="rId29"/>
+    <p:sldId id="284" r:id="rId30"/>
+    <p:sldId id="285" r:id="rId31"/>
+    <p:sldId id="286" r:id="rId32"/>
+    <p:sldId id="287" r:id="rId33"/>
+    <p:sldId id="288" r:id="rId34"/>
+    <p:sldId id="289" r:id="rId35"/>
   </p:sldIdLst>
   <p:sldSz cx="12192000" cy="6858000"/>
   <p:notesSz cx="6858000" cy="9144000"/>
@@ -139,7 +140,19 @@
       </a:defRPr>
     </a:lvl9pPr>
   </p:defaultTextStyle>
+  <p:extLst>
+    <p:ext uri="{EFAFB233-063F-42B5-8137-9DF3F51BA10A}">
+      <p15:sldGuideLst xmlns:p15="http://schemas.microsoft.com/office/powerpoint/2012/main"/>
+    </p:ext>
+    <p:ext uri="{2D200454-40CA-4A62-9FC3-DE9A4176ACB9}">
+      <p15:notesGuideLst xmlns:p15="http://schemas.microsoft.com/office/powerpoint/2012/main"/>
+    </p:ext>
+  </p:extLst>
 </p:presentation>
+</file>
+
+<file path=ppt/revisionInfo.xml><?xml version="1.0" encoding="utf-8"?>
+<p1510:revInfo xmlns:a="http://schemas.openxmlformats.org/drawingml/2006/main" xmlns:r="http://schemas.openxmlformats.org/officeDocument/2006/relationships" xmlns:p1510="http://schemas.microsoft.com/office/powerpoint/2015/10/main"/>
 </file>
 
 <file path=ppt/notesMasters/notesMaster1.xml><?xml version="1.0" encoding="utf-8"?>
@@ -224,7 +237,7 @@
           <a:p>
             <a:fld id="{25E8FC91-496F-439D-B22A-BF20314D23F5}" type="datetimeFigureOut">
               <a:rPr lang="en-US" smtClean="0"/>
-              <a:t>6/29/2017</a:t>
+              <a:t>6/30/2017</a:t>
             </a:fld>
             <a:endParaRPr lang="en-US"/>
           </a:p>
@@ -827,7 +840,7 @@
           <a:p>
             <a:fld id="{CE7CA6D7-84D8-44A2-9183-BBB9F8549707}" type="slidenum">
               <a:rPr lang="en-US" smtClean="0"/>
-              <a:t>32</a:t>
+              <a:t>33</a:t>
             </a:fld>
             <a:endParaRPr lang="en-US"/>
           </a:p>
@@ -1348,7 +1361,7 @@
           <a:p>
             <a:fld id="{A46D54B9-1683-4546-B605-E3CA622DB03B}" type="datetimeFigureOut">
               <a:rPr lang="en-US" smtClean="0"/>
-              <a:t>6/29/2017</a:t>
+              <a:t>6/30/2017</a:t>
             </a:fld>
             <a:endParaRPr lang="en-US"/>
           </a:p>
@@ -1644,7 +1657,7 @@
           <a:p>
             <a:fld id="{A46D54B9-1683-4546-B605-E3CA622DB03B}" type="datetimeFigureOut">
               <a:rPr lang="en-US" smtClean="0"/>
-              <a:t>6/29/2017</a:t>
+              <a:t>6/30/2017</a:t>
             </a:fld>
             <a:endParaRPr lang="en-US"/>
           </a:p>
@@ -1892,7 +1905,7 @@
           <a:p>
             <a:fld id="{A46D54B9-1683-4546-B605-E3CA622DB03B}" type="datetimeFigureOut">
               <a:rPr lang="en-US" smtClean="0"/>
-              <a:t>6/29/2017</a:t>
+              <a:t>6/30/2017</a:t>
             </a:fld>
             <a:endParaRPr lang="en-US"/>
           </a:p>
@@ -2432,7 +2445,7 @@
           <a:p>
             <a:fld id="{A46D54B9-1683-4546-B605-E3CA622DB03B}" type="datetimeFigureOut">
               <a:rPr lang="en-US" smtClean="0"/>
-              <a:t>6/29/2017</a:t>
+              <a:t>6/30/2017</a:t>
             </a:fld>
             <a:endParaRPr lang="en-US"/>
           </a:p>
@@ -2680,7 +2693,7 @@
           <a:p>
             <a:fld id="{A46D54B9-1683-4546-B605-E3CA622DB03B}" type="datetimeFigureOut">
               <a:rPr lang="en-US" smtClean="0"/>
-              <a:t>6/29/2017</a:t>
+              <a:t>6/30/2017</a:t>
             </a:fld>
             <a:endParaRPr lang="en-US"/>
           </a:p>
@@ -3212,7 +3225,7 @@
           <a:p>
             <a:fld id="{A46D54B9-1683-4546-B605-E3CA622DB03B}" type="datetimeFigureOut">
               <a:rPr lang="en-US" smtClean="0"/>
-              <a:t>6/29/2017</a:t>
+              <a:t>6/30/2017</a:t>
             </a:fld>
             <a:endParaRPr lang="en-US"/>
           </a:p>
@@ -3509,7 +3522,7 @@
           <a:p>
             <a:fld id="{A46D54B9-1683-4546-B605-E3CA622DB03B}" type="datetimeFigureOut">
               <a:rPr lang="en-US" smtClean="0"/>
-              <a:t>6/29/2017</a:t>
+              <a:t>6/30/2017</a:t>
             </a:fld>
             <a:endParaRPr lang="en-US"/>
           </a:p>
@@ -3683,7 +3696,7 @@
           <a:p>
             <a:fld id="{A46D54B9-1683-4546-B605-E3CA622DB03B}" type="datetimeFigureOut">
               <a:rPr lang="en-US" smtClean="0"/>
-              <a:t>6/29/2017</a:t>
+              <a:t>6/30/2017</a:t>
             </a:fld>
             <a:endParaRPr lang="en-US"/>
           </a:p>
@@ -3863,7 +3876,7 @@
           <a:p>
             <a:fld id="{A46D54B9-1683-4546-B605-E3CA622DB03B}" type="datetimeFigureOut">
               <a:rPr lang="en-US" smtClean="0"/>
-              <a:t>6/29/2017</a:t>
+              <a:t>6/30/2017</a:t>
             </a:fld>
             <a:endParaRPr lang="en-US"/>
           </a:p>
@@ -4090,7 +4103,7 @@
           <a:p>
             <a:fld id="{A46D54B9-1683-4546-B605-E3CA622DB03B}" type="datetimeFigureOut">
               <a:rPr lang="en-US" smtClean="0"/>
-              <a:t>6/29/2017</a:t>
+              <a:t>6/30/2017</a:t>
             </a:fld>
             <a:endParaRPr lang="en-US"/>
           </a:p>
@@ -4341,7 +4354,7 @@
           <a:p>
             <a:fld id="{A46D54B9-1683-4546-B605-E3CA622DB03B}" type="datetimeFigureOut">
               <a:rPr lang="en-US" smtClean="0"/>
-              <a:t>6/29/2017</a:t>
+              <a:t>6/30/2017</a:t>
             </a:fld>
             <a:endParaRPr lang="en-US"/>
           </a:p>
@@ -4688,7 +4701,7 @@
           <a:p>
             <a:fld id="{A46D54B9-1683-4546-B605-E3CA622DB03B}" type="datetimeFigureOut">
               <a:rPr lang="en-US" smtClean="0"/>
-              <a:t>6/29/2017</a:t>
+              <a:t>6/30/2017</a:t>
             </a:fld>
             <a:endParaRPr lang="en-US"/>
           </a:p>
@@ -5180,7 +5193,7 @@
           <a:p>
             <a:fld id="{A46D54B9-1683-4546-B605-E3CA622DB03B}" type="datetimeFigureOut">
               <a:rPr lang="en-US" smtClean="0"/>
-              <a:t>6/29/2017</a:t>
+              <a:t>6/30/2017</a:t>
             </a:fld>
             <a:endParaRPr lang="en-US"/>
           </a:p>
@@ -5298,7 +5311,7 @@
           <a:p>
             <a:fld id="{A46D54B9-1683-4546-B605-E3CA622DB03B}" type="datetimeFigureOut">
               <a:rPr lang="en-US" smtClean="0"/>
-              <a:t>6/29/2017</a:t>
+              <a:t>6/30/2017</a:t>
             </a:fld>
             <a:endParaRPr lang="en-US"/>
           </a:p>
@@ -5393,7 +5406,7 @@
           <a:p>
             <a:fld id="{A46D54B9-1683-4546-B605-E3CA622DB03B}" type="datetimeFigureOut">
               <a:rPr lang="en-US" smtClean="0"/>
-              <a:t>6/29/2017</a:t>
+              <a:t>6/30/2017</a:t>
             </a:fld>
             <a:endParaRPr lang="en-US"/>
           </a:p>
@@ -5676,7 +5689,7 @@
           <a:p>
             <a:fld id="{A46D54B9-1683-4546-B605-E3CA622DB03B}" type="datetimeFigureOut">
               <a:rPr lang="en-US" smtClean="0"/>
-              <a:t>6/29/2017</a:t>
+              <a:t>6/30/2017</a:t>
             </a:fld>
             <a:endParaRPr lang="en-US"/>
           </a:p>
@@ -5967,7 +5980,7 @@
           <a:p>
             <a:fld id="{A46D54B9-1683-4546-B605-E3CA622DB03B}" type="datetimeFigureOut">
               <a:rPr lang="en-US" smtClean="0"/>
-              <a:t>6/29/2017</a:t>
+              <a:t>6/30/2017</a:t>
             </a:fld>
             <a:endParaRPr lang="en-US"/>
           </a:p>
@@ -6497,7 +6510,7 @@
           <a:p>
             <a:fld id="{A46D54B9-1683-4546-B605-E3CA622DB03B}" type="datetimeFigureOut">
               <a:rPr lang="en-US" smtClean="0"/>
-              <a:t>6/29/2017</a:t>
+              <a:t>6/30/2017</a:t>
             </a:fld>
             <a:endParaRPr lang="en-US"/>
           </a:p>
@@ -9638,6 +9651,2567 @@
       </p:grpSpPr>
       <p:sp>
         <p:nvSpPr>
+          <p:cNvPr id="57" name="Rectangle: Rounded Corners 56">
+            <a:extLst>
+              <a:ext uri="{FF2B5EF4-FFF2-40B4-BE49-F238E27FC236}">
+                <a16:creationId xmlns:a16="http://schemas.microsoft.com/office/drawing/2014/main" id="{AA804FD5-4FB7-4BBC-AF02-21C28BD56CBF}"/>
+              </a:ext>
+            </a:extLst>
+          </p:cNvPr>
+          <p:cNvSpPr/>
+          <p:nvPr/>
+        </p:nvSpPr>
+        <p:spPr>
+          <a:xfrm>
+            <a:off x="7551849" y="1683441"/>
+            <a:ext cx="3275807" cy="1741930"/>
+          </a:xfrm>
+          <a:prstGeom prst="roundRect">
+            <a:avLst/>
+          </a:prstGeom>
+        </p:spPr>
+        <p:style>
+          <a:lnRef idx="2">
+            <a:schemeClr val="accent6"/>
+          </a:lnRef>
+          <a:fillRef idx="1">
+            <a:schemeClr val="lt1"/>
+          </a:fillRef>
+          <a:effectRef idx="0">
+            <a:schemeClr val="accent6"/>
+          </a:effectRef>
+          <a:fontRef idx="minor">
+            <a:schemeClr val="dk1"/>
+          </a:fontRef>
+        </p:style>
+        <p:txBody>
+          <a:bodyPr rtlCol="0" anchor="ctr"/>
+          <a:lstStyle/>
+          <a:p>
+            <a:pPr algn="ctr"/>
+            <a:endParaRPr lang="en-US"/>
+          </a:p>
+        </p:txBody>
+      </p:sp>
+      <p:pic>
+        <p:nvPicPr>
+          <p:cNvPr id="4" name="Picture 3" descr="A close up of a logo&#10;&#10;Description generated with very high confidence">
+            <a:extLst>
+              <a:ext uri="{FF2B5EF4-FFF2-40B4-BE49-F238E27FC236}">
+                <a16:creationId xmlns:a16="http://schemas.microsoft.com/office/drawing/2014/main" id="{74A7A1B8-25E5-46BA-A587-780AE2252AB7}"/>
+              </a:ext>
+            </a:extLst>
+          </p:cNvPr>
+          <p:cNvPicPr>
+            <a:picLocks noChangeAspect="1"/>
+          </p:cNvPicPr>
+          <p:nvPr/>
+        </p:nvPicPr>
+        <p:blipFill>
+          <a:blip r:embed="rId2">
+            <a:extLst>
+              <a:ext uri="{28A0092B-C50C-407E-A947-70E740481C1C}">
+                <a14:useLocalDpi xmlns:a14="http://schemas.microsoft.com/office/drawing/2010/main" val="0"/>
+              </a:ext>
+            </a:extLst>
+          </a:blip>
+          <a:stretch>
+            <a:fillRect/>
+          </a:stretch>
+        </p:blipFill>
+        <p:spPr>
+          <a:xfrm>
+            <a:off x="1151252" y="4163785"/>
+            <a:ext cx="1154293" cy="1277815"/>
+          </a:xfrm>
+          <a:prstGeom prst="rect">
+            <a:avLst/>
+          </a:prstGeom>
+        </p:spPr>
+      </p:pic>
+      <p:pic>
+        <p:nvPicPr>
+          <p:cNvPr id="5" name="Picture 4">
+            <a:extLst>
+              <a:ext uri="{FF2B5EF4-FFF2-40B4-BE49-F238E27FC236}">
+                <a16:creationId xmlns:a16="http://schemas.microsoft.com/office/drawing/2014/main" id="{6515246D-44E1-48DF-908F-4819F56FF3CF}"/>
+              </a:ext>
+            </a:extLst>
+          </p:cNvPr>
+          <p:cNvPicPr>
+            <a:picLocks noChangeAspect="1"/>
+          </p:cNvPicPr>
+          <p:nvPr/>
+        </p:nvPicPr>
+        <p:blipFill>
+          <a:blip r:embed="rId3">
+            <a:extLst>
+              <a:ext uri="{28A0092B-C50C-407E-A947-70E740481C1C}">
+                <a14:useLocalDpi xmlns:a14="http://schemas.microsoft.com/office/drawing/2010/main" val="0"/>
+              </a:ext>
+            </a:extLst>
+          </a:blip>
+          <a:stretch>
+            <a:fillRect/>
+          </a:stretch>
+        </p:blipFill>
+        <p:spPr>
+          <a:xfrm>
+            <a:off x="5401643" y="3776050"/>
+            <a:ext cx="3145456" cy="2053283"/>
+          </a:xfrm>
+          <a:prstGeom prst="rect">
+            <a:avLst/>
+          </a:prstGeom>
+        </p:spPr>
+      </p:pic>
+      <p:cxnSp>
+        <p:nvCxnSpPr>
+          <p:cNvPr id="6" name="Straight Arrow Connector 5">
+            <a:extLst>
+              <a:ext uri="{FF2B5EF4-FFF2-40B4-BE49-F238E27FC236}">
+                <a16:creationId xmlns:a16="http://schemas.microsoft.com/office/drawing/2014/main" id="{8E609F2C-F073-4A62-8ABD-76D59787E71F}"/>
+              </a:ext>
+            </a:extLst>
+          </p:cNvPr>
+          <p:cNvCxnSpPr>
+            <a:cxnSpLocks/>
+            <a:stCxn id="4" idx="3"/>
+            <a:endCxn id="5" idx="1"/>
+          </p:cNvCxnSpPr>
+          <p:nvPr/>
+        </p:nvCxnSpPr>
+        <p:spPr>
+          <a:xfrm flipV="1">
+            <a:off x="2305545" y="4802692"/>
+            <a:ext cx="3096098" cy="1"/>
+          </a:xfrm>
+          <a:prstGeom prst="straightConnector1">
+            <a:avLst/>
+          </a:prstGeom>
+          <a:ln w="76200">
+            <a:tailEnd type="triangle"/>
+          </a:ln>
+        </p:spPr>
+        <p:style>
+          <a:lnRef idx="2">
+            <a:schemeClr val="accent1"/>
+          </a:lnRef>
+          <a:fillRef idx="0">
+            <a:schemeClr val="accent1"/>
+          </a:fillRef>
+          <a:effectRef idx="1">
+            <a:schemeClr val="accent1"/>
+          </a:effectRef>
+          <a:fontRef idx="minor">
+            <a:schemeClr val="tx1"/>
+          </a:fontRef>
+        </p:style>
+      </p:cxnSp>
+      <p:pic>
+        <p:nvPicPr>
+          <p:cNvPr id="9" name="Picture 8">
+            <a:extLst>
+              <a:ext uri="{FF2B5EF4-FFF2-40B4-BE49-F238E27FC236}">
+                <a16:creationId xmlns:a16="http://schemas.microsoft.com/office/drawing/2014/main" id="{8F8378A7-8776-45BA-8F0A-6955BB32635F}"/>
+              </a:ext>
+            </a:extLst>
+          </p:cNvPr>
+          <p:cNvPicPr>
+            <a:picLocks noChangeAspect="1"/>
+          </p:cNvPicPr>
+          <p:nvPr/>
+        </p:nvPicPr>
+        <p:blipFill>
+          <a:blip r:embed="rId4">
+            <a:extLst>
+              <a:ext uri="{28A0092B-C50C-407E-A947-70E740481C1C}">
+                <a14:useLocalDpi xmlns:a14="http://schemas.microsoft.com/office/drawing/2010/main" val="0"/>
+              </a:ext>
+            </a:extLst>
+          </a:blip>
+          <a:stretch>
+            <a:fillRect/>
+          </a:stretch>
+        </p:blipFill>
+        <p:spPr>
+          <a:xfrm>
+            <a:off x="3971982" y="3944893"/>
+            <a:ext cx="1429661" cy="1715595"/>
+          </a:xfrm>
+          <a:prstGeom prst="rect">
+            <a:avLst/>
+          </a:prstGeom>
+        </p:spPr>
+      </p:pic>
+      <p:sp>
+        <p:nvSpPr>
+          <p:cNvPr id="10" name="TextBox 9">
+            <a:extLst>
+              <a:ext uri="{FF2B5EF4-FFF2-40B4-BE49-F238E27FC236}">
+                <a16:creationId xmlns:a16="http://schemas.microsoft.com/office/drawing/2014/main" id="{E4E7B743-E30A-4AC2-8CF6-11F183472B71}"/>
+              </a:ext>
+            </a:extLst>
+          </p:cNvPr>
+          <p:cNvSpPr txBox="1"/>
+          <p:nvPr/>
+        </p:nvSpPr>
+        <p:spPr>
+          <a:xfrm>
+            <a:off x="3757568" y="5660488"/>
+            <a:ext cx="1858489" cy="813525"/>
+          </a:xfrm>
+          <a:prstGeom prst="rect">
+            <a:avLst/>
+          </a:prstGeom>
+          <a:noFill/>
+        </p:spPr>
+        <p:txBody>
+          <a:bodyPr wrap="square" lIns="0" tIns="0" rIns="0" bIns="0" rtlCol="0" anchor="t">
+            <a:noAutofit/>
+          </a:bodyPr>
+          <a:lstStyle/>
+          <a:p>
+            <a:pPr algn="ctr"/>
+            <a:r>
+              <a:rPr lang="en-US" sz="2400" b="1" dirty="0"/>
+              <a:t>Amazon API Gateway</a:t>
+            </a:r>
+          </a:p>
+        </p:txBody>
+      </p:sp>
+      <p:cxnSp>
+        <p:nvCxnSpPr>
+          <p:cNvPr id="12" name="Straight Arrow Connector 11">
+            <a:extLst>
+              <a:ext uri="{FF2B5EF4-FFF2-40B4-BE49-F238E27FC236}">
+                <a16:creationId xmlns:a16="http://schemas.microsoft.com/office/drawing/2014/main" id="{5E226BFD-DC01-478C-8EBE-2EE8832A0510}"/>
+              </a:ext>
+            </a:extLst>
+          </p:cNvPr>
+          <p:cNvCxnSpPr>
+            <a:cxnSpLocks/>
+            <a:stCxn id="4" idx="3"/>
+            <a:endCxn id="9" idx="1"/>
+          </p:cNvCxnSpPr>
+          <p:nvPr/>
+        </p:nvCxnSpPr>
+        <p:spPr>
+          <a:xfrm flipV="1">
+            <a:off x="2305545" y="4802691"/>
+            <a:ext cx="1666437" cy="2"/>
+          </a:xfrm>
+          <a:prstGeom prst="straightConnector1">
+            <a:avLst/>
+          </a:prstGeom>
+          <a:ln w="76200">
+            <a:tailEnd type="triangle"/>
+          </a:ln>
+        </p:spPr>
+        <p:style>
+          <a:lnRef idx="2">
+            <a:schemeClr val="accent1"/>
+          </a:lnRef>
+          <a:fillRef idx="0">
+            <a:schemeClr val="accent1"/>
+          </a:fillRef>
+          <a:effectRef idx="1">
+            <a:schemeClr val="accent1"/>
+          </a:effectRef>
+          <a:fontRef idx="minor">
+            <a:schemeClr val="tx1"/>
+          </a:fontRef>
+        </p:style>
+      </p:cxnSp>
+      <p:cxnSp>
+        <p:nvCxnSpPr>
+          <p:cNvPr id="16" name="Straight Arrow Connector 15">
+            <a:extLst>
+              <a:ext uri="{FF2B5EF4-FFF2-40B4-BE49-F238E27FC236}">
+                <a16:creationId xmlns:a16="http://schemas.microsoft.com/office/drawing/2014/main" id="{C87B0B0C-1C4B-4775-B0F9-6AFC23B6DF43}"/>
+              </a:ext>
+            </a:extLst>
+          </p:cNvPr>
+          <p:cNvCxnSpPr>
+            <a:cxnSpLocks/>
+          </p:cNvCxnSpPr>
+          <p:nvPr/>
+        </p:nvCxnSpPr>
+        <p:spPr>
+          <a:xfrm flipV="1">
+            <a:off x="4670484" y="2962527"/>
+            <a:ext cx="0" cy="813523"/>
+          </a:xfrm>
+          <a:prstGeom prst="straightConnector1">
+            <a:avLst/>
+          </a:prstGeom>
+          <a:ln w="76200">
+            <a:tailEnd type="triangle"/>
+          </a:ln>
+        </p:spPr>
+        <p:style>
+          <a:lnRef idx="2">
+            <a:schemeClr val="accent1"/>
+          </a:lnRef>
+          <a:fillRef idx="0">
+            <a:schemeClr val="accent1"/>
+          </a:fillRef>
+          <a:effectRef idx="1">
+            <a:schemeClr val="accent1"/>
+          </a:effectRef>
+          <a:fontRef idx="minor">
+            <a:schemeClr val="tx1"/>
+          </a:fontRef>
+        </p:style>
+      </p:cxnSp>
+      <p:pic>
+        <p:nvPicPr>
+          <p:cNvPr id="17" name="Picture 16">
+            <a:extLst>
+              <a:ext uri="{FF2B5EF4-FFF2-40B4-BE49-F238E27FC236}">
+                <a16:creationId xmlns:a16="http://schemas.microsoft.com/office/drawing/2014/main" id="{76B6DEDF-1F95-4CDB-9214-9282B4B9DD7A}"/>
+              </a:ext>
+            </a:extLst>
+          </p:cNvPr>
+          <p:cNvPicPr>
+            <a:picLocks noChangeAspect="1"/>
+          </p:cNvPicPr>
+          <p:nvPr/>
+        </p:nvPicPr>
+        <p:blipFill>
+          <a:blip r:embed="rId5">
+            <a:extLst>
+              <a:ext uri="{28A0092B-C50C-407E-A947-70E740481C1C}">
+                <a14:useLocalDpi xmlns:a14="http://schemas.microsoft.com/office/drawing/2010/main" val="0"/>
+              </a:ext>
+            </a:extLst>
+          </a:blip>
+          <a:stretch>
+            <a:fillRect/>
+          </a:stretch>
+        </p:blipFill>
+        <p:spPr>
+          <a:xfrm>
+            <a:off x="3950888" y="683882"/>
+            <a:ext cx="1439192" cy="1727031"/>
+          </a:xfrm>
+          <a:prstGeom prst="rect">
+            <a:avLst/>
+          </a:prstGeom>
+        </p:spPr>
+      </p:pic>
+      <p:sp>
+        <p:nvSpPr>
+          <p:cNvPr id="19" name="TextBox 18">
+            <a:extLst>
+              <a:ext uri="{FF2B5EF4-FFF2-40B4-BE49-F238E27FC236}">
+                <a16:creationId xmlns:a16="http://schemas.microsoft.com/office/drawing/2014/main" id="{13EF59D1-3329-4DF9-AB0E-4BF19C24E2C1}"/>
+              </a:ext>
+            </a:extLst>
+          </p:cNvPr>
+          <p:cNvSpPr txBox="1"/>
+          <p:nvPr/>
+        </p:nvSpPr>
+        <p:spPr>
+          <a:xfrm>
+            <a:off x="3757568" y="2427069"/>
+            <a:ext cx="1858489" cy="813525"/>
+          </a:xfrm>
+          <a:prstGeom prst="rect">
+            <a:avLst/>
+          </a:prstGeom>
+          <a:noFill/>
+        </p:spPr>
+        <p:txBody>
+          <a:bodyPr wrap="square" lIns="0" tIns="0" rIns="0" bIns="0" rtlCol="0" anchor="t">
+            <a:noAutofit/>
+          </a:bodyPr>
+          <a:lstStyle/>
+          <a:p>
+            <a:pPr algn="ctr"/>
+            <a:r>
+              <a:rPr lang="en-US" sz="2400" b="1" dirty="0"/>
+              <a:t>AWS Lambda</a:t>
+            </a:r>
+          </a:p>
+        </p:txBody>
+      </p:sp>
+      <p:pic>
+        <p:nvPicPr>
+          <p:cNvPr id="23" name="Picture 22">
+            <a:extLst>
+              <a:ext uri="{FF2B5EF4-FFF2-40B4-BE49-F238E27FC236}">
+                <a16:creationId xmlns:a16="http://schemas.microsoft.com/office/drawing/2014/main" id="{6164C83E-1817-4A12-87FB-8FC0E4F43A2B}"/>
+              </a:ext>
+            </a:extLst>
+          </p:cNvPr>
+          <p:cNvPicPr>
+            <a:picLocks noChangeAspect="1"/>
+          </p:cNvPicPr>
+          <p:nvPr/>
+        </p:nvPicPr>
+        <p:blipFill>
+          <a:blip r:embed="rId6">
+            <a:extLst>
+              <a:ext uri="{28A0092B-C50C-407E-A947-70E740481C1C}">
+                <a14:useLocalDpi xmlns:a14="http://schemas.microsoft.com/office/drawing/2010/main" val="0"/>
+              </a:ext>
+            </a:extLst>
+          </a:blip>
+          <a:stretch>
+            <a:fillRect/>
+          </a:stretch>
+        </p:blipFill>
+        <p:spPr>
+          <a:xfrm>
+            <a:off x="8547099" y="0"/>
+            <a:ext cx="1353426" cy="1632074"/>
+          </a:xfrm>
+          <a:prstGeom prst="rect">
+            <a:avLst/>
+          </a:prstGeom>
+        </p:spPr>
+      </p:pic>
+      <p:cxnSp>
+        <p:nvCxnSpPr>
+          <p:cNvPr id="25" name="Connector: Elbow 24">
+            <a:extLst>
+              <a:ext uri="{FF2B5EF4-FFF2-40B4-BE49-F238E27FC236}">
+                <a16:creationId xmlns:a16="http://schemas.microsoft.com/office/drawing/2014/main" id="{EB5376CC-1A0D-4EE5-92FA-FC81A78B88BD}"/>
+              </a:ext>
+            </a:extLst>
+          </p:cNvPr>
+          <p:cNvCxnSpPr>
+            <a:cxnSpLocks/>
+            <a:stCxn id="17" idx="0"/>
+          </p:cNvCxnSpPr>
+          <p:nvPr/>
+        </p:nvCxnSpPr>
+        <p:spPr>
+          <a:xfrm rot="5400000" flipH="1" flipV="1">
+            <a:off x="6250523" y="-1253465"/>
+            <a:ext cx="357309" cy="3517387"/>
+          </a:xfrm>
+          <a:prstGeom prst="bentConnector2">
+            <a:avLst/>
+          </a:prstGeom>
+          <a:ln w="76200">
+            <a:tailEnd type="triangle"/>
+          </a:ln>
+        </p:spPr>
+        <p:style>
+          <a:lnRef idx="2">
+            <a:schemeClr val="accent1"/>
+          </a:lnRef>
+          <a:fillRef idx="0">
+            <a:schemeClr val="accent1"/>
+          </a:fillRef>
+          <a:effectRef idx="1">
+            <a:schemeClr val="accent1"/>
+          </a:effectRef>
+          <a:fontRef idx="minor">
+            <a:schemeClr val="tx1"/>
+          </a:fontRef>
+        </p:style>
+      </p:cxnSp>
+      <p:sp>
+        <p:nvSpPr>
+          <p:cNvPr id="27" name="TextBox 26">
+            <a:extLst>
+              <a:ext uri="{FF2B5EF4-FFF2-40B4-BE49-F238E27FC236}">
+                <a16:creationId xmlns:a16="http://schemas.microsoft.com/office/drawing/2014/main" id="{7453C955-CDA4-4FD2-BE5C-805F1487CF9C}"/>
+              </a:ext>
+            </a:extLst>
+          </p:cNvPr>
+          <p:cNvSpPr txBox="1"/>
+          <p:nvPr/>
+        </p:nvSpPr>
+        <p:spPr>
+          <a:xfrm>
+            <a:off x="9900525" y="409274"/>
+            <a:ext cx="1877785" cy="813525"/>
+          </a:xfrm>
+          <a:prstGeom prst="rect">
+            <a:avLst/>
+          </a:prstGeom>
+          <a:noFill/>
+        </p:spPr>
+        <p:txBody>
+          <a:bodyPr wrap="square" lIns="0" tIns="0" rIns="0" bIns="0" rtlCol="0" anchor="t">
+            <a:noAutofit/>
+          </a:bodyPr>
+          <a:lstStyle/>
+          <a:p>
+            <a:pPr algn="ctr"/>
+            <a:r>
+              <a:rPr lang="en-US" sz="2400" b="1" dirty="0"/>
+              <a:t>AWS Step Functions</a:t>
+            </a:r>
+          </a:p>
+        </p:txBody>
+      </p:sp>
+      <p:pic>
+        <p:nvPicPr>
+          <p:cNvPr id="28" name="Picture 27">
+            <a:extLst>
+              <a:ext uri="{FF2B5EF4-FFF2-40B4-BE49-F238E27FC236}">
+                <a16:creationId xmlns:a16="http://schemas.microsoft.com/office/drawing/2014/main" id="{08808396-F033-45B4-8330-187E90F984D6}"/>
+              </a:ext>
+            </a:extLst>
+          </p:cNvPr>
+          <p:cNvPicPr>
+            <a:picLocks noChangeAspect="1"/>
+          </p:cNvPicPr>
+          <p:nvPr/>
+        </p:nvPicPr>
+        <p:blipFill>
+          <a:blip r:embed="rId7">
+            <a:extLst>
+              <a:ext uri="{28A0092B-C50C-407E-A947-70E740481C1C}">
+                <a14:useLocalDpi xmlns:a14="http://schemas.microsoft.com/office/drawing/2010/main" val="0"/>
+              </a:ext>
+            </a:extLst>
+          </a:blip>
+          <a:stretch>
+            <a:fillRect/>
+          </a:stretch>
+        </p:blipFill>
+        <p:spPr>
+          <a:xfrm>
+            <a:off x="7813465" y="1979676"/>
+            <a:ext cx="733634" cy="762405"/>
+          </a:xfrm>
+          <a:prstGeom prst="rect">
+            <a:avLst/>
+          </a:prstGeom>
+        </p:spPr>
+      </p:pic>
+      <p:pic>
+        <p:nvPicPr>
+          <p:cNvPr id="30" name="Picture 29">
+            <a:extLst>
+              <a:ext uri="{FF2B5EF4-FFF2-40B4-BE49-F238E27FC236}">
+                <a16:creationId xmlns:a16="http://schemas.microsoft.com/office/drawing/2014/main" id="{501A7399-B845-4866-B99C-8BF800F3AD72}"/>
+              </a:ext>
+            </a:extLst>
+          </p:cNvPr>
+          <p:cNvPicPr>
+            <a:picLocks noChangeAspect="1"/>
+          </p:cNvPicPr>
+          <p:nvPr/>
+        </p:nvPicPr>
+        <p:blipFill>
+          <a:blip r:embed="rId7">
+            <a:extLst>
+              <a:ext uri="{28A0092B-C50C-407E-A947-70E740481C1C}">
+                <a14:useLocalDpi xmlns:a14="http://schemas.microsoft.com/office/drawing/2010/main" val="0"/>
+              </a:ext>
+            </a:extLst>
+          </a:blip>
+          <a:stretch>
+            <a:fillRect/>
+          </a:stretch>
+        </p:blipFill>
+        <p:spPr>
+          <a:xfrm>
+            <a:off x="8876608" y="1979676"/>
+            <a:ext cx="733634" cy="762405"/>
+          </a:xfrm>
+          <a:prstGeom prst="rect">
+            <a:avLst/>
+          </a:prstGeom>
+        </p:spPr>
+      </p:pic>
+      <p:pic>
+        <p:nvPicPr>
+          <p:cNvPr id="31" name="Picture 30">
+            <a:extLst>
+              <a:ext uri="{FF2B5EF4-FFF2-40B4-BE49-F238E27FC236}">
+                <a16:creationId xmlns:a16="http://schemas.microsoft.com/office/drawing/2014/main" id="{9796D5A9-04BF-49C2-A0EA-8853A3C1BCD9}"/>
+              </a:ext>
+            </a:extLst>
+          </p:cNvPr>
+          <p:cNvPicPr>
+            <a:picLocks noChangeAspect="1"/>
+          </p:cNvPicPr>
+          <p:nvPr/>
+        </p:nvPicPr>
+        <p:blipFill>
+          <a:blip r:embed="rId7">
+            <a:extLst>
+              <a:ext uri="{28A0092B-C50C-407E-A947-70E740481C1C}">
+                <a14:useLocalDpi xmlns:a14="http://schemas.microsoft.com/office/drawing/2010/main" val="0"/>
+              </a:ext>
+            </a:extLst>
+          </a:blip>
+          <a:stretch>
+            <a:fillRect/>
+          </a:stretch>
+        </p:blipFill>
+        <p:spPr>
+          <a:xfrm>
+            <a:off x="9938027" y="1979676"/>
+            <a:ext cx="733634" cy="762405"/>
+          </a:xfrm>
+          <a:prstGeom prst="rect">
+            <a:avLst/>
+          </a:prstGeom>
+        </p:spPr>
+      </p:pic>
+      <p:cxnSp>
+        <p:nvCxnSpPr>
+          <p:cNvPr id="33" name="Connector: Elbow 32">
+            <a:extLst>
+              <a:ext uri="{FF2B5EF4-FFF2-40B4-BE49-F238E27FC236}">
+                <a16:creationId xmlns:a16="http://schemas.microsoft.com/office/drawing/2014/main" id="{0A544060-AFE4-4382-AC63-9AF3901CAD6A}"/>
+              </a:ext>
+            </a:extLst>
+          </p:cNvPr>
+          <p:cNvCxnSpPr>
+            <a:stCxn id="23" idx="2"/>
+            <a:endCxn id="28" idx="0"/>
+          </p:cNvCxnSpPr>
+          <p:nvPr/>
+        </p:nvCxnSpPr>
+        <p:spPr>
+          <a:xfrm rot="5400000">
+            <a:off x="8528246" y="1284110"/>
+            <a:ext cx="347602" cy="1043530"/>
+          </a:xfrm>
+          <a:prstGeom prst="bentConnector3">
+            <a:avLst/>
+          </a:prstGeom>
+          <a:ln w="28575">
+            <a:tailEnd type="triangle"/>
+          </a:ln>
+        </p:spPr>
+        <p:style>
+          <a:lnRef idx="2">
+            <a:schemeClr val="accent1"/>
+          </a:lnRef>
+          <a:fillRef idx="0">
+            <a:schemeClr val="accent1"/>
+          </a:fillRef>
+          <a:effectRef idx="1">
+            <a:schemeClr val="accent1"/>
+          </a:effectRef>
+          <a:fontRef idx="minor">
+            <a:schemeClr val="tx1"/>
+          </a:fontRef>
+        </p:style>
+      </p:cxnSp>
+      <p:cxnSp>
+        <p:nvCxnSpPr>
+          <p:cNvPr id="36" name="Connector: Elbow 35">
+            <a:extLst>
+              <a:ext uri="{FF2B5EF4-FFF2-40B4-BE49-F238E27FC236}">
+                <a16:creationId xmlns:a16="http://schemas.microsoft.com/office/drawing/2014/main" id="{5886CFD1-5C7B-4C97-A984-E2BE040ACF14}"/>
+              </a:ext>
+            </a:extLst>
+          </p:cNvPr>
+          <p:cNvCxnSpPr>
+            <a:stCxn id="23" idx="2"/>
+            <a:endCxn id="30" idx="0"/>
+          </p:cNvCxnSpPr>
+          <p:nvPr/>
+        </p:nvCxnSpPr>
+        <p:spPr>
+          <a:xfrm rot="16200000" flipH="1">
+            <a:off x="9059817" y="1796068"/>
+            <a:ext cx="347602" cy="19613"/>
+          </a:xfrm>
+          <a:prstGeom prst="bentConnector3">
+            <a:avLst/>
+          </a:prstGeom>
+          <a:ln w="28575">
+            <a:tailEnd type="triangle"/>
+          </a:ln>
+        </p:spPr>
+        <p:style>
+          <a:lnRef idx="2">
+            <a:schemeClr val="accent1"/>
+          </a:lnRef>
+          <a:fillRef idx="0">
+            <a:schemeClr val="accent1"/>
+          </a:fillRef>
+          <a:effectRef idx="1">
+            <a:schemeClr val="accent1"/>
+          </a:effectRef>
+          <a:fontRef idx="minor">
+            <a:schemeClr val="tx1"/>
+          </a:fontRef>
+        </p:style>
+      </p:cxnSp>
+      <p:cxnSp>
+        <p:nvCxnSpPr>
+          <p:cNvPr id="38" name="Connector: Elbow 37">
+            <a:extLst>
+              <a:ext uri="{FF2B5EF4-FFF2-40B4-BE49-F238E27FC236}">
+                <a16:creationId xmlns:a16="http://schemas.microsoft.com/office/drawing/2014/main" id="{4D62F5C1-099B-4234-8F45-9B7D0138AE00}"/>
+              </a:ext>
+            </a:extLst>
+          </p:cNvPr>
+          <p:cNvCxnSpPr>
+            <a:stCxn id="23" idx="2"/>
+            <a:endCxn id="31" idx="0"/>
+          </p:cNvCxnSpPr>
+          <p:nvPr/>
+        </p:nvCxnSpPr>
+        <p:spPr>
+          <a:xfrm rot="16200000" flipH="1">
+            <a:off x="9590527" y="1265359"/>
+            <a:ext cx="347602" cy="1081032"/>
+          </a:xfrm>
+          <a:prstGeom prst="bentConnector3">
+            <a:avLst/>
+          </a:prstGeom>
+          <a:ln w="28575">
+            <a:tailEnd type="triangle"/>
+          </a:ln>
+        </p:spPr>
+        <p:style>
+          <a:lnRef idx="2">
+            <a:schemeClr val="accent1"/>
+          </a:lnRef>
+          <a:fillRef idx="0">
+            <a:schemeClr val="accent1"/>
+          </a:fillRef>
+          <a:effectRef idx="1">
+            <a:schemeClr val="accent1"/>
+          </a:effectRef>
+          <a:fontRef idx="minor">
+            <a:schemeClr val="tx1"/>
+          </a:fontRef>
+        </p:style>
+      </p:cxnSp>
+      <p:pic>
+        <p:nvPicPr>
+          <p:cNvPr id="41" name="Picture 40">
+            <a:extLst>
+              <a:ext uri="{FF2B5EF4-FFF2-40B4-BE49-F238E27FC236}">
+                <a16:creationId xmlns:a16="http://schemas.microsoft.com/office/drawing/2014/main" id="{B9BC1C5E-8313-4821-94C6-42E14EF8976E}"/>
+              </a:ext>
+            </a:extLst>
+          </p:cNvPr>
+          <p:cNvPicPr>
+            <a:picLocks noChangeAspect="1"/>
+          </p:cNvPicPr>
+          <p:nvPr/>
+        </p:nvPicPr>
+        <p:blipFill>
+          <a:blip r:embed="rId8">
+            <a:extLst>
+              <a:ext uri="{28A0092B-C50C-407E-A947-70E740481C1C}">
+                <a14:useLocalDpi xmlns:a14="http://schemas.microsoft.com/office/drawing/2010/main" val="0"/>
+              </a:ext>
+            </a:extLst>
+          </a:blip>
+          <a:stretch>
+            <a:fillRect/>
+          </a:stretch>
+        </p:blipFill>
+        <p:spPr>
+          <a:xfrm>
+            <a:off x="6302497" y="1043406"/>
+            <a:ext cx="936270" cy="936270"/>
+          </a:xfrm>
+          <a:prstGeom prst="rect">
+            <a:avLst/>
+          </a:prstGeom>
+        </p:spPr>
+      </p:pic>
+      <p:cxnSp>
+        <p:nvCxnSpPr>
+          <p:cNvPr id="42" name="Straight Arrow Connector 41">
+            <a:extLst>
+              <a:ext uri="{FF2B5EF4-FFF2-40B4-BE49-F238E27FC236}">
+                <a16:creationId xmlns:a16="http://schemas.microsoft.com/office/drawing/2014/main" id="{4E71F5FB-8095-4C56-8AA1-D7411087FAC0}"/>
+              </a:ext>
+            </a:extLst>
+          </p:cNvPr>
+          <p:cNvCxnSpPr>
+            <a:cxnSpLocks/>
+          </p:cNvCxnSpPr>
+          <p:nvPr/>
+        </p:nvCxnSpPr>
+        <p:spPr>
+          <a:xfrm>
+            <a:off x="5638419" y="4802690"/>
+            <a:ext cx="790758" cy="0"/>
+          </a:xfrm>
+          <a:prstGeom prst="straightConnector1">
+            <a:avLst/>
+          </a:prstGeom>
+          <a:ln w="76200">
+            <a:tailEnd type="triangle"/>
+          </a:ln>
+        </p:spPr>
+        <p:style>
+          <a:lnRef idx="2">
+            <a:schemeClr val="accent1"/>
+          </a:lnRef>
+          <a:fillRef idx="0">
+            <a:schemeClr val="accent1"/>
+          </a:fillRef>
+          <a:effectRef idx="1">
+            <a:schemeClr val="accent1"/>
+          </a:effectRef>
+          <a:fontRef idx="minor">
+            <a:schemeClr val="tx1"/>
+          </a:fontRef>
+        </p:style>
+      </p:cxnSp>
+      <p:pic>
+        <p:nvPicPr>
+          <p:cNvPr id="44" name="Picture 43">
+            <a:extLst>
+              <a:ext uri="{FF2B5EF4-FFF2-40B4-BE49-F238E27FC236}">
+                <a16:creationId xmlns:a16="http://schemas.microsoft.com/office/drawing/2014/main" id="{6A002473-BED6-4D76-93F6-74F1E37D2258}"/>
+              </a:ext>
+            </a:extLst>
+          </p:cNvPr>
+          <p:cNvPicPr>
+            <a:picLocks noChangeAspect="1"/>
+          </p:cNvPicPr>
+          <p:nvPr/>
+        </p:nvPicPr>
+        <p:blipFill>
+          <a:blip r:embed="rId9">
+            <a:extLst>
+              <a:ext uri="{28A0092B-C50C-407E-A947-70E740481C1C}">
+                <a14:useLocalDpi xmlns:a14="http://schemas.microsoft.com/office/drawing/2010/main" val="0"/>
+              </a:ext>
+            </a:extLst>
+          </a:blip>
+          <a:stretch>
+            <a:fillRect/>
+          </a:stretch>
+        </p:blipFill>
+        <p:spPr>
+          <a:xfrm>
+            <a:off x="6562226" y="4092545"/>
+            <a:ext cx="712000" cy="1349055"/>
+          </a:xfrm>
+          <a:prstGeom prst="rect">
+            <a:avLst/>
+          </a:prstGeom>
+        </p:spPr>
+      </p:pic>
+      <p:sp>
+        <p:nvSpPr>
+          <p:cNvPr id="45" name="TextBox 44">
+            <a:extLst>
+              <a:ext uri="{FF2B5EF4-FFF2-40B4-BE49-F238E27FC236}">
+                <a16:creationId xmlns:a16="http://schemas.microsoft.com/office/drawing/2014/main" id="{6838AB54-A2EF-4D04-AEC3-87B837FA8075}"/>
+              </a:ext>
+            </a:extLst>
+          </p:cNvPr>
+          <p:cNvSpPr txBox="1"/>
+          <p:nvPr/>
+        </p:nvSpPr>
+        <p:spPr>
+          <a:xfrm>
+            <a:off x="5988981" y="5823919"/>
+            <a:ext cx="1858489" cy="813525"/>
+          </a:xfrm>
+          <a:prstGeom prst="rect">
+            <a:avLst/>
+          </a:prstGeom>
+          <a:noFill/>
+        </p:spPr>
+        <p:txBody>
+          <a:bodyPr wrap="square" lIns="0" tIns="0" rIns="0" bIns="0" rtlCol="0" anchor="t">
+            <a:noAutofit/>
+          </a:bodyPr>
+          <a:lstStyle/>
+          <a:p>
+            <a:pPr algn="ctr"/>
+            <a:r>
+              <a:rPr lang="en-US" sz="2400" b="1" dirty="0"/>
+              <a:t>IAM</a:t>
+            </a:r>
+          </a:p>
+        </p:txBody>
+      </p:sp>
+      <p:cxnSp>
+        <p:nvCxnSpPr>
+          <p:cNvPr id="47" name="Connector: Elbow 46">
+            <a:extLst>
+              <a:ext uri="{FF2B5EF4-FFF2-40B4-BE49-F238E27FC236}">
+                <a16:creationId xmlns:a16="http://schemas.microsoft.com/office/drawing/2014/main" id="{9FB1D02D-691F-4852-BF96-E58063259F45}"/>
+              </a:ext>
+            </a:extLst>
+          </p:cNvPr>
+          <p:cNvCxnSpPr>
+            <a:cxnSpLocks/>
+            <a:stCxn id="28" idx="2"/>
+            <a:endCxn id="49" idx="2"/>
+          </p:cNvCxnSpPr>
+          <p:nvPr/>
+        </p:nvCxnSpPr>
+        <p:spPr>
+          <a:xfrm rot="5400000" flipH="1">
+            <a:off x="7361983" y="1923782"/>
+            <a:ext cx="226948" cy="1409650"/>
+          </a:xfrm>
+          <a:prstGeom prst="bentConnector3">
+            <a:avLst>
+              <a:gd name="adj1" fmla="val -100728"/>
+            </a:avLst>
+          </a:prstGeom>
+          <a:ln w="28575">
+            <a:tailEnd type="triangle"/>
+          </a:ln>
+        </p:spPr>
+        <p:style>
+          <a:lnRef idx="2">
+            <a:schemeClr val="accent1"/>
+          </a:lnRef>
+          <a:fillRef idx="0">
+            <a:schemeClr val="accent1"/>
+          </a:fillRef>
+          <a:effectRef idx="1">
+            <a:schemeClr val="accent1"/>
+          </a:effectRef>
+          <a:fontRef idx="minor">
+            <a:schemeClr val="tx1"/>
+          </a:fontRef>
+        </p:style>
+      </p:cxnSp>
+      <p:sp>
+        <p:nvSpPr>
+          <p:cNvPr id="49" name="TextBox 48">
+            <a:extLst>
+              <a:ext uri="{FF2B5EF4-FFF2-40B4-BE49-F238E27FC236}">
+                <a16:creationId xmlns:a16="http://schemas.microsoft.com/office/drawing/2014/main" id="{5CD991AB-1381-49ED-B319-FF860A82E326}"/>
+              </a:ext>
+            </a:extLst>
+          </p:cNvPr>
+          <p:cNvSpPr txBox="1"/>
+          <p:nvPr/>
+        </p:nvSpPr>
+        <p:spPr>
+          <a:xfrm>
+            <a:off x="5841387" y="2073495"/>
+            <a:ext cx="1858489" cy="441638"/>
+          </a:xfrm>
+          <a:prstGeom prst="rect">
+            <a:avLst/>
+          </a:prstGeom>
+          <a:noFill/>
+        </p:spPr>
+        <p:txBody>
+          <a:bodyPr wrap="square" lIns="0" tIns="0" rIns="0" bIns="0" rtlCol="0" anchor="t">
+            <a:noAutofit/>
+          </a:bodyPr>
+          <a:lstStyle/>
+          <a:p>
+            <a:pPr algn="ctr"/>
+            <a:r>
+              <a:rPr lang="en-US" sz="2400" b="1" dirty="0"/>
+              <a:t>SNS</a:t>
+            </a:r>
+          </a:p>
+        </p:txBody>
+      </p:sp>
+      <p:cxnSp>
+        <p:nvCxnSpPr>
+          <p:cNvPr id="55" name="Connector: Elbow 54">
+            <a:extLst>
+              <a:ext uri="{FF2B5EF4-FFF2-40B4-BE49-F238E27FC236}">
+                <a16:creationId xmlns:a16="http://schemas.microsoft.com/office/drawing/2014/main" id="{647F2C4D-10DD-48AF-93D2-C3D0A200A711}"/>
+              </a:ext>
+            </a:extLst>
+          </p:cNvPr>
+          <p:cNvCxnSpPr>
+            <a:stCxn id="41" idx="1"/>
+            <a:endCxn id="30" idx="2"/>
+          </p:cNvCxnSpPr>
+          <p:nvPr/>
+        </p:nvCxnSpPr>
+        <p:spPr>
+          <a:xfrm rot="10800000" flipH="1" flipV="1">
+            <a:off x="6302497" y="1511541"/>
+            <a:ext cx="2940928" cy="1230540"/>
+          </a:xfrm>
+          <a:prstGeom prst="bentConnector4">
+            <a:avLst>
+              <a:gd name="adj1" fmla="val -7773"/>
+              <a:gd name="adj2" fmla="val 142167"/>
+            </a:avLst>
+          </a:prstGeom>
+          <a:ln w="28575">
+            <a:tailEnd type="triangle"/>
+          </a:ln>
+        </p:spPr>
+        <p:style>
+          <a:lnRef idx="2">
+            <a:schemeClr val="accent1"/>
+          </a:lnRef>
+          <a:fillRef idx="0">
+            <a:schemeClr val="accent1"/>
+          </a:fillRef>
+          <a:effectRef idx="1">
+            <a:schemeClr val="accent1"/>
+          </a:effectRef>
+          <a:fontRef idx="minor">
+            <a:schemeClr val="tx1"/>
+          </a:fontRef>
+        </p:style>
+      </p:cxnSp>
+      <p:pic>
+        <p:nvPicPr>
+          <p:cNvPr id="58" name="Picture 57">
+            <a:extLst>
+              <a:ext uri="{FF2B5EF4-FFF2-40B4-BE49-F238E27FC236}">
+                <a16:creationId xmlns:a16="http://schemas.microsoft.com/office/drawing/2014/main" id="{BF157A13-5ED7-4476-B57B-1F7FF239C96F}"/>
+              </a:ext>
+            </a:extLst>
+          </p:cNvPr>
+          <p:cNvPicPr>
+            <a:picLocks noChangeAspect="1"/>
+          </p:cNvPicPr>
+          <p:nvPr/>
+        </p:nvPicPr>
+        <p:blipFill>
+          <a:blip r:embed="rId10">
+            <a:extLst>
+              <a:ext uri="{28A0092B-C50C-407E-A947-70E740481C1C}">
+                <a14:useLocalDpi xmlns:a14="http://schemas.microsoft.com/office/drawing/2010/main" val="0"/>
+              </a:ext>
+            </a:extLst>
+          </a:blip>
+          <a:stretch>
+            <a:fillRect/>
+          </a:stretch>
+        </p:blipFill>
+        <p:spPr>
+          <a:xfrm>
+            <a:off x="1716581" y="151191"/>
+            <a:ext cx="948446" cy="1050588"/>
+          </a:xfrm>
+          <a:prstGeom prst="rect">
+            <a:avLst/>
+          </a:prstGeom>
+        </p:spPr>
+      </p:pic>
+      <p:pic>
+        <p:nvPicPr>
+          <p:cNvPr id="59" name="Picture 58">
+            <a:extLst>
+              <a:ext uri="{FF2B5EF4-FFF2-40B4-BE49-F238E27FC236}">
+                <a16:creationId xmlns:a16="http://schemas.microsoft.com/office/drawing/2014/main" id="{FF94F3BB-A7D1-422C-91E1-A52F26A1D0E7}"/>
+              </a:ext>
+            </a:extLst>
+          </p:cNvPr>
+          <p:cNvPicPr>
+            <a:picLocks noChangeAspect="1"/>
+          </p:cNvPicPr>
+          <p:nvPr/>
+        </p:nvPicPr>
+        <p:blipFill>
+          <a:blip r:embed="rId11">
+            <a:extLst>
+              <a:ext uri="{28A0092B-C50C-407E-A947-70E740481C1C}">
+                <a14:useLocalDpi xmlns:a14="http://schemas.microsoft.com/office/drawing/2010/main" val="0"/>
+              </a:ext>
+            </a:extLst>
+          </a:blip>
+          <a:stretch>
+            <a:fillRect/>
+          </a:stretch>
+        </p:blipFill>
+        <p:spPr>
+          <a:xfrm>
+            <a:off x="1648495" y="1759611"/>
+            <a:ext cx="1016532" cy="1202916"/>
+          </a:xfrm>
+          <a:prstGeom prst="rect">
+            <a:avLst/>
+          </a:prstGeom>
+        </p:spPr>
+      </p:pic>
+      <p:cxnSp>
+        <p:nvCxnSpPr>
+          <p:cNvPr id="60" name="Straight Arrow Connector 59">
+            <a:extLst>
+              <a:ext uri="{FF2B5EF4-FFF2-40B4-BE49-F238E27FC236}">
+                <a16:creationId xmlns:a16="http://schemas.microsoft.com/office/drawing/2014/main" id="{164CF06A-E73F-4F91-9650-32F76E245F9D}"/>
+              </a:ext>
+            </a:extLst>
+          </p:cNvPr>
+          <p:cNvCxnSpPr>
+            <a:cxnSpLocks/>
+          </p:cNvCxnSpPr>
+          <p:nvPr/>
+        </p:nvCxnSpPr>
+        <p:spPr>
+          <a:xfrm flipH="1">
+            <a:off x="2853002" y="816036"/>
+            <a:ext cx="714831" cy="0"/>
+          </a:xfrm>
+          <a:prstGeom prst="straightConnector1">
+            <a:avLst/>
+          </a:prstGeom>
+          <a:ln w="76200">
+            <a:tailEnd type="triangle"/>
+          </a:ln>
+        </p:spPr>
+        <p:style>
+          <a:lnRef idx="2">
+            <a:schemeClr val="accent1"/>
+          </a:lnRef>
+          <a:fillRef idx="0">
+            <a:schemeClr val="accent1"/>
+          </a:fillRef>
+          <a:effectRef idx="1">
+            <a:schemeClr val="accent1"/>
+          </a:effectRef>
+          <a:fontRef idx="minor">
+            <a:schemeClr val="tx1"/>
+          </a:fontRef>
+        </p:style>
+      </p:cxnSp>
+      <p:cxnSp>
+        <p:nvCxnSpPr>
+          <p:cNvPr id="65" name="Straight Arrow Connector 64">
+            <a:extLst>
+              <a:ext uri="{FF2B5EF4-FFF2-40B4-BE49-F238E27FC236}">
+                <a16:creationId xmlns:a16="http://schemas.microsoft.com/office/drawing/2014/main" id="{643B0856-9BAC-46A5-AD79-7720F9396C63}"/>
+              </a:ext>
+            </a:extLst>
+          </p:cNvPr>
+          <p:cNvCxnSpPr>
+            <a:cxnSpLocks/>
+          </p:cNvCxnSpPr>
+          <p:nvPr/>
+        </p:nvCxnSpPr>
+        <p:spPr>
+          <a:xfrm>
+            <a:off x="2924657" y="1027269"/>
+            <a:ext cx="643176" cy="16137"/>
+          </a:xfrm>
+          <a:prstGeom prst="straightConnector1">
+            <a:avLst/>
+          </a:prstGeom>
+          <a:ln w="76200">
+            <a:tailEnd type="triangle"/>
+          </a:ln>
+        </p:spPr>
+        <p:style>
+          <a:lnRef idx="2">
+            <a:schemeClr val="accent1"/>
+          </a:lnRef>
+          <a:fillRef idx="0">
+            <a:schemeClr val="accent1"/>
+          </a:fillRef>
+          <a:effectRef idx="1">
+            <a:schemeClr val="accent1"/>
+          </a:effectRef>
+          <a:fontRef idx="minor">
+            <a:schemeClr val="tx1"/>
+          </a:fontRef>
+        </p:style>
+      </p:cxnSp>
+      <p:cxnSp>
+        <p:nvCxnSpPr>
+          <p:cNvPr id="78" name="Straight Arrow Connector 77">
+            <a:extLst>
+              <a:ext uri="{FF2B5EF4-FFF2-40B4-BE49-F238E27FC236}">
+                <a16:creationId xmlns:a16="http://schemas.microsoft.com/office/drawing/2014/main" id="{FE691D83-1731-4A86-B46C-BC64792CBB1D}"/>
+              </a:ext>
+            </a:extLst>
+          </p:cNvPr>
+          <p:cNvCxnSpPr>
+            <a:cxnSpLocks/>
+          </p:cNvCxnSpPr>
+          <p:nvPr/>
+        </p:nvCxnSpPr>
+        <p:spPr>
+          <a:xfrm flipH="1">
+            <a:off x="2860883" y="2199699"/>
+            <a:ext cx="714831" cy="0"/>
+          </a:xfrm>
+          <a:prstGeom prst="straightConnector1">
+            <a:avLst/>
+          </a:prstGeom>
+          <a:ln w="76200">
+            <a:tailEnd type="triangle"/>
+          </a:ln>
+        </p:spPr>
+        <p:style>
+          <a:lnRef idx="2">
+            <a:schemeClr val="accent1"/>
+          </a:lnRef>
+          <a:fillRef idx="0">
+            <a:schemeClr val="accent1"/>
+          </a:fillRef>
+          <a:effectRef idx="1">
+            <a:schemeClr val="accent1"/>
+          </a:effectRef>
+          <a:fontRef idx="minor">
+            <a:schemeClr val="tx1"/>
+          </a:fontRef>
+        </p:style>
+      </p:cxnSp>
+      <p:cxnSp>
+        <p:nvCxnSpPr>
+          <p:cNvPr id="79" name="Straight Arrow Connector 78">
+            <a:extLst>
+              <a:ext uri="{FF2B5EF4-FFF2-40B4-BE49-F238E27FC236}">
+                <a16:creationId xmlns:a16="http://schemas.microsoft.com/office/drawing/2014/main" id="{D1A134AD-68D9-4A0A-A06C-82909B3F98EF}"/>
+              </a:ext>
+            </a:extLst>
+          </p:cNvPr>
+          <p:cNvCxnSpPr>
+            <a:cxnSpLocks/>
+          </p:cNvCxnSpPr>
+          <p:nvPr/>
+        </p:nvCxnSpPr>
+        <p:spPr>
+          <a:xfrm>
+            <a:off x="2932538" y="2410932"/>
+            <a:ext cx="643176" cy="16137"/>
+          </a:xfrm>
+          <a:prstGeom prst="straightConnector1">
+            <a:avLst/>
+          </a:prstGeom>
+          <a:ln w="76200">
+            <a:tailEnd type="triangle"/>
+          </a:ln>
+        </p:spPr>
+        <p:style>
+          <a:lnRef idx="2">
+            <a:schemeClr val="accent1"/>
+          </a:lnRef>
+          <a:fillRef idx="0">
+            <a:schemeClr val="accent1"/>
+          </a:fillRef>
+          <a:effectRef idx="1">
+            <a:schemeClr val="accent1"/>
+          </a:effectRef>
+          <a:fontRef idx="minor">
+            <a:schemeClr val="tx1"/>
+          </a:fontRef>
+        </p:style>
+      </p:cxnSp>
+      <p:sp>
+        <p:nvSpPr>
+          <p:cNvPr id="80" name="TextBox 79">
+            <a:extLst>
+              <a:ext uri="{FF2B5EF4-FFF2-40B4-BE49-F238E27FC236}">
+                <a16:creationId xmlns:a16="http://schemas.microsoft.com/office/drawing/2014/main" id="{46A70D3B-29F9-4FC4-AF03-2E9B4670D0CF}"/>
+              </a:ext>
+            </a:extLst>
+          </p:cNvPr>
+          <p:cNvSpPr txBox="1"/>
+          <p:nvPr/>
+        </p:nvSpPr>
+        <p:spPr>
+          <a:xfrm>
+            <a:off x="1274403" y="3103932"/>
+            <a:ext cx="1858489" cy="813525"/>
+          </a:xfrm>
+          <a:prstGeom prst="rect">
+            <a:avLst/>
+          </a:prstGeom>
+          <a:noFill/>
+        </p:spPr>
+        <p:txBody>
+          <a:bodyPr wrap="square" lIns="0" tIns="0" rIns="0" bIns="0" rtlCol="0" anchor="t">
+            <a:noAutofit/>
+          </a:bodyPr>
+          <a:lstStyle/>
+          <a:p>
+            <a:pPr algn="ctr"/>
+            <a:r>
+              <a:rPr lang="en-US" sz="2400" b="1" dirty="0"/>
+              <a:t>S3</a:t>
+            </a:r>
+          </a:p>
+        </p:txBody>
+      </p:sp>
+      <p:sp>
+        <p:nvSpPr>
+          <p:cNvPr id="81" name="TextBox 80">
+            <a:extLst>
+              <a:ext uri="{FF2B5EF4-FFF2-40B4-BE49-F238E27FC236}">
+                <a16:creationId xmlns:a16="http://schemas.microsoft.com/office/drawing/2014/main" id="{3FA2725C-B062-4246-9B4C-122193A43A2C}"/>
+              </a:ext>
+            </a:extLst>
+          </p:cNvPr>
+          <p:cNvSpPr txBox="1"/>
+          <p:nvPr/>
+        </p:nvSpPr>
+        <p:spPr>
+          <a:xfrm>
+            <a:off x="1227516" y="1282146"/>
+            <a:ext cx="1858489" cy="813525"/>
+          </a:xfrm>
+          <a:prstGeom prst="rect">
+            <a:avLst/>
+          </a:prstGeom>
+          <a:noFill/>
+        </p:spPr>
+        <p:txBody>
+          <a:bodyPr wrap="square" lIns="0" tIns="0" rIns="0" bIns="0" rtlCol="0" anchor="t">
+            <a:noAutofit/>
+          </a:bodyPr>
+          <a:lstStyle/>
+          <a:p>
+            <a:pPr algn="ctr"/>
+            <a:r>
+              <a:rPr lang="en-US" sz="2400" b="1" dirty="0"/>
+              <a:t>DynamoDB</a:t>
+            </a:r>
+          </a:p>
+        </p:txBody>
+      </p:sp>
+    </p:spTree>
+    <p:extLst>
+      <p:ext uri="{BB962C8B-B14F-4D97-AF65-F5344CB8AC3E}">
+        <p14:creationId xmlns:p14="http://schemas.microsoft.com/office/powerpoint/2010/main" val="4291989654"/>
+      </p:ext>
+    </p:extLst>
+  </p:cSld>
+  <p:clrMapOvr>
+    <a:masterClrMapping/>
+  </p:clrMapOvr>
+  <p:timing>
+    <p:tnLst>
+      <p:par>
+        <p:cTn id="1" dur="indefinite" restart="never" nodeType="tmRoot">
+          <p:childTnLst>
+            <p:seq concurrent="1" nextAc="seek">
+              <p:cTn id="2" dur="indefinite" nodeType="mainSeq">
+                <p:childTnLst>
+                  <p:par>
+                    <p:cTn id="3" fill="hold">
+                      <p:stCondLst>
+                        <p:cond delay="indefinite"/>
+                        <p:cond evt="onBegin" delay="0">
+                          <p:tn val="2"/>
+                        </p:cond>
+                      </p:stCondLst>
+                      <p:childTnLst>
+                        <p:par>
+                          <p:cTn id="4" fill="hold">
+                            <p:stCondLst>
+                              <p:cond delay="0"/>
+                            </p:stCondLst>
+                            <p:childTnLst>
+                              <p:par>
+                                <p:cTn id="5" presetID="1" presetClass="entr" presetSubtype="0" fill="hold" nodeType="withEffect">
+                                  <p:stCondLst>
+                                    <p:cond delay="0"/>
+                                  </p:stCondLst>
+                                  <p:childTnLst>
+                                    <p:set>
+                                      <p:cBhvr>
+                                        <p:cTn id="6" dur="1" fill="hold">
+                                          <p:stCondLst>
+                                            <p:cond delay="0"/>
+                                          </p:stCondLst>
+                                        </p:cTn>
+                                        <p:tgtEl>
+                                          <p:spTgt spid="4"/>
+                                        </p:tgtEl>
+                                        <p:attrNameLst>
+                                          <p:attrName>style.visibility</p:attrName>
+                                        </p:attrNameLst>
+                                      </p:cBhvr>
+                                      <p:to>
+                                        <p:strVal val="visible"/>
+                                      </p:to>
+                                    </p:set>
+                                  </p:childTnLst>
+                                </p:cTn>
+                              </p:par>
+                            </p:childTnLst>
+                          </p:cTn>
+                        </p:par>
+                      </p:childTnLst>
+                    </p:cTn>
+                  </p:par>
+                  <p:par>
+                    <p:cTn id="7" fill="hold">
+                      <p:stCondLst>
+                        <p:cond delay="indefinite"/>
+                      </p:stCondLst>
+                      <p:childTnLst>
+                        <p:par>
+                          <p:cTn id="8" fill="hold">
+                            <p:stCondLst>
+                              <p:cond delay="0"/>
+                            </p:stCondLst>
+                            <p:childTnLst>
+                              <p:par>
+                                <p:cTn id="9" presetID="1" presetClass="entr" presetSubtype="0" fill="hold" nodeType="clickEffect">
+                                  <p:stCondLst>
+                                    <p:cond delay="0"/>
+                                  </p:stCondLst>
+                                  <p:childTnLst>
+                                    <p:set>
+                                      <p:cBhvr>
+                                        <p:cTn id="10" dur="1" fill="hold">
+                                          <p:stCondLst>
+                                            <p:cond delay="0"/>
+                                          </p:stCondLst>
+                                        </p:cTn>
+                                        <p:tgtEl>
+                                          <p:spTgt spid="6"/>
+                                        </p:tgtEl>
+                                        <p:attrNameLst>
+                                          <p:attrName>style.visibility</p:attrName>
+                                        </p:attrNameLst>
+                                      </p:cBhvr>
+                                      <p:to>
+                                        <p:strVal val="visible"/>
+                                      </p:to>
+                                    </p:set>
+                                  </p:childTnLst>
+                                </p:cTn>
+                              </p:par>
+                              <p:par>
+                                <p:cTn id="11" presetID="1" presetClass="entr" presetSubtype="0" fill="hold" nodeType="withEffect">
+                                  <p:stCondLst>
+                                    <p:cond delay="0"/>
+                                  </p:stCondLst>
+                                  <p:childTnLst>
+                                    <p:set>
+                                      <p:cBhvr>
+                                        <p:cTn id="12" dur="1" fill="hold">
+                                          <p:stCondLst>
+                                            <p:cond delay="0"/>
+                                          </p:stCondLst>
+                                        </p:cTn>
+                                        <p:tgtEl>
+                                          <p:spTgt spid="5"/>
+                                        </p:tgtEl>
+                                        <p:attrNameLst>
+                                          <p:attrName>style.visibility</p:attrName>
+                                        </p:attrNameLst>
+                                      </p:cBhvr>
+                                      <p:to>
+                                        <p:strVal val="visible"/>
+                                      </p:to>
+                                    </p:set>
+                                  </p:childTnLst>
+                                </p:cTn>
+                              </p:par>
+                            </p:childTnLst>
+                          </p:cTn>
+                        </p:par>
+                      </p:childTnLst>
+                    </p:cTn>
+                  </p:par>
+                  <p:par>
+                    <p:cTn id="13" fill="hold">
+                      <p:stCondLst>
+                        <p:cond delay="indefinite"/>
+                      </p:stCondLst>
+                      <p:childTnLst>
+                        <p:par>
+                          <p:cTn id="14" fill="hold">
+                            <p:stCondLst>
+                              <p:cond delay="0"/>
+                            </p:stCondLst>
+                            <p:childTnLst>
+                              <p:par>
+                                <p:cTn id="15" presetID="1" presetClass="exit" presetSubtype="0" fill="hold" nodeType="clickEffect">
+                                  <p:stCondLst>
+                                    <p:cond delay="0"/>
+                                  </p:stCondLst>
+                                  <p:childTnLst>
+                                    <p:set>
+                                      <p:cBhvr>
+                                        <p:cTn id="16" dur="1" fill="hold">
+                                          <p:stCondLst>
+                                            <p:cond delay="0"/>
+                                          </p:stCondLst>
+                                        </p:cTn>
+                                        <p:tgtEl>
+                                          <p:spTgt spid="6"/>
+                                        </p:tgtEl>
+                                        <p:attrNameLst>
+                                          <p:attrName>style.visibility</p:attrName>
+                                        </p:attrNameLst>
+                                      </p:cBhvr>
+                                      <p:to>
+                                        <p:strVal val="hidden"/>
+                                      </p:to>
+                                    </p:set>
+                                  </p:childTnLst>
+                                </p:cTn>
+                              </p:par>
+                              <p:par>
+                                <p:cTn id="17" presetID="1" presetClass="exit" presetSubtype="0" fill="hold" nodeType="withEffect">
+                                  <p:stCondLst>
+                                    <p:cond delay="0"/>
+                                  </p:stCondLst>
+                                  <p:childTnLst>
+                                    <p:set>
+                                      <p:cBhvr>
+                                        <p:cTn id="18" dur="1" fill="hold">
+                                          <p:stCondLst>
+                                            <p:cond delay="0"/>
+                                          </p:stCondLst>
+                                        </p:cTn>
+                                        <p:tgtEl>
+                                          <p:spTgt spid="5"/>
+                                        </p:tgtEl>
+                                        <p:attrNameLst>
+                                          <p:attrName>style.visibility</p:attrName>
+                                        </p:attrNameLst>
+                                      </p:cBhvr>
+                                      <p:to>
+                                        <p:strVal val="hidden"/>
+                                      </p:to>
+                                    </p:set>
+                                  </p:childTnLst>
+                                </p:cTn>
+                              </p:par>
+                              <p:par>
+                                <p:cTn id="19" presetID="1" presetClass="entr" presetSubtype="0" fill="hold" nodeType="withEffect">
+                                  <p:stCondLst>
+                                    <p:cond delay="0"/>
+                                  </p:stCondLst>
+                                  <p:childTnLst>
+                                    <p:set>
+                                      <p:cBhvr>
+                                        <p:cTn id="20" dur="1" fill="hold">
+                                          <p:stCondLst>
+                                            <p:cond delay="0"/>
+                                          </p:stCondLst>
+                                        </p:cTn>
+                                        <p:tgtEl>
+                                          <p:spTgt spid="12"/>
+                                        </p:tgtEl>
+                                        <p:attrNameLst>
+                                          <p:attrName>style.visibility</p:attrName>
+                                        </p:attrNameLst>
+                                      </p:cBhvr>
+                                      <p:to>
+                                        <p:strVal val="visible"/>
+                                      </p:to>
+                                    </p:set>
+                                  </p:childTnLst>
+                                </p:cTn>
+                              </p:par>
+                              <p:par>
+                                <p:cTn id="21" presetID="1" presetClass="entr" presetSubtype="0" fill="hold" nodeType="withEffect">
+                                  <p:stCondLst>
+                                    <p:cond delay="0"/>
+                                  </p:stCondLst>
+                                  <p:childTnLst>
+                                    <p:set>
+                                      <p:cBhvr>
+                                        <p:cTn id="22" dur="1" fill="hold">
+                                          <p:stCondLst>
+                                            <p:cond delay="0"/>
+                                          </p:stCondLst>
+                                        </p:cTn>
+                                        <p:tgtEl>
+                                          <p:spTgt spid="9"/>
+                                        </p:tgtEl>
+                                        <p:attrNameLst>
+                                          <p:attrName>style.visibility</p:attrName>
+                                        </p:attrNameLst>
+                                      </p:cBhvr>
+                                      <p:to>
+                                        <p:strVal val="visible"/>
+                                      </p:to>
+                                    </p:set>
+                                  </p:childTnLst>
+                                </p:cTn>
+                              </p:par>
+                              <p:par>
+                                <p:cTn id="23" presetID="1" presetClass="entr" presetSubtype="0" fill="hold" grpId="0" nodeType="withEffect">
+                                  <p:stCondLst>
+                                    <p:cond delay="0"/>
+                                  </p:stCondLst>
+                                  <p:childTnLst>
+                                    <p:set>
+                                      <p:cBhvr>
+                                        <p:cTn id="24" dur="1" fill="hold">
+                                          <p:stCondLst>
+                                            <p:cond delay="0"/>
+                                          </p:stCondLst>
+                                        </p:cTn>
+                                        <p:tgtEl>
+                                          <p:spTgt spid="10"/>
+                                        </p:tgtEl>
+                                        <p:attrNameLst>
+                                          <p:attrName>style.visibility</p:attrName>
+                                        </p:attrNameLst>
+                                      </p:cBhvr>
+                                      <p:to>
+                                        <p:strVal val="visible"/>
+                                      </p:to>
+                                    </p:set>
+                                  </p:childTnLst>
+                                </p:cTn>
+                              </p:par>
+                            </p:childTnLst>
+                          </p:cTn>
+                        </p:par>
+                      </p:childTnLst>
+                    </p:cTn>
+                  </p:par>
+                  <p:par>
+                    <p:cTn id="25" fill="hold">
+                      <p:stCondLst>
+                        <p:cond delay="indefinite"/>
+                      </p:stCondLst>
+                      <p:childTnLst>
+                        <p:par>
+                          <p:cTn id="26" fill="hold">
+                            <p:stCondLst>
+                              <p:cond delay="0"/>
+                            </p:stCondLst>
+                            <p:childTnLst>
+                              <p:par>
+                                <p:cTn id="27" presetID="1" presetClass="entr" presetSubtype="0" fill="hold" nodeType="clickEffect">
+                                  <p:stCondLst>
+                                    <p:cond delay="0"/>
+                                  </p:stCondLst>
+                                  <p:childTnLst>
+                                    <p:set>
+                                      <p:cBhvr>
+                                        <p:cTn id="28" dur="1" fill="hold">
+                                          <p:stCondLst>
+                                            <p:cond delay="0"/>
+                                          </p:stCondLst>
+                                        </p:cTn>
+                                        <p:tgtEl>
+                                          <p:spTgt spid="42"/>
+                                        </p:tgtEl>
+                                        <p:attrNameLst>
+                                          <p:attrName>style.visibility</p:attrName>
+                                        </p:attrNameLst>
+                                      </p:cBhvr>
+                                      <p:to>
+                                        <p:strVal val="visible"/>
+                                      </p:to>
+                                    </p:set>
+                                  </p:childTnLst>
+                                </p:cTn>
+                              </p:par>
+                              <p:par>
+                                <p:cTn id="29" presetID="1" presetClass="entr" presetSubtype="0" fill="hold" grpId="0" nodeType="withEffect">
+                                  <p:stCondLst>
+                                    <p:cond delay="0"/>
+                                  </p:stCondLst>
+                                  <p:childTnLst>
+                                    <p:set>
+                                      <p:cBhvr>
+                                        <p:cTn id="30" dur="1" fill="hold">
+                                          <p:stCondLst>
+                                            <p:cond delay="0"/>
+                                          </p:stCondLst>
+                                        </p:cTn>
+                                        <p:tgtEl>
+                                          <p:spTgt spid="45"/>
+                                        </p:tgtEl>
+                                        <p:attrNameLst>
+                                          <p:attrName>style.visibility</p:attrName>
+                                        </p:attrNameLst>
+                                      </p:cBhvr>
+                                      <p:to>
+                                        <p:strVal val="visible"/>
+                                      </p:to>
+                                    </p:set>
+                                  </p:childTnLst>
+                                </p:cTn>
+                              </p:par>
+                              <p:par>
+                                <p:cTn id="31" presetID="1" presetClass="entr" presetSubtype="0" fill="hold" nodeType="withEffect">
+                                  <p:stCondLst>
+                                    <p:cond delay="0"/>
+                                  </p:stCondLst>
+                                  <p:childTnLst>
+                                    <p:set>
+                                      <p:cBhvr>
+                                        <p:cTn id="32" dur="1" fill="hold">
+                                          <p:stCondLst>
+                                            <p:cond delay="0"/>
+                                          </p:stCondLst>
+                                        </p:cTn>
+                                        <p:tgtEl>
+                                          <p:spTgt spid="44"/>
+                                        </p:tgtEl>
+                                        <p:attrNameLst>
+                                          <p:attrName>style.visibility</p:attrName>
+                                        </p:attrNameLst>
+                                      </p:cBhvr>
+                                      <p:to>
+                                        <p:strVal val="visible"/>
+                                      </p:to>
+                                    </p:set>
+                                  </p:childTnLst>
+                                </p:cTn>
+                              </p:par>
+                            </p:childTnLst>
+                          </p:cTn>
+                        </p:par>
+                      </p:childTnLst>
+                    </p:cTn>
+                  </p:par>
+                  <p:par>
+                    <p:cTn id="33" fill="hold">
+                      <p:stCondLst>
+                        <p:cond delay="indefinite"/>
+                      </p:stCondLst>
+                      <p:childTnLst>
+                        <p:par>
+                          <p:cTn id="34" fill="hold">
+                            <p:stCondLst>
+                              <p:cond delay="0"/>
+                            </p:stCondLst>
+                            <p:childTnLst>
+                              <p:par>
+                                <p:cTn id="35" presetID="1" presetClass="entr" presetSubtype="0" fill="hold" nodeType="clickEffect">
+                                  <p:stCondLst>
+                                    <p:cond delay="0"/>
+                                  </p:stCondLst>
+                                  <p:childTnLst>
+                                    <p:set>
+                                      <p:cBhvr>
+                                        <p:cTn id="36" dur="1" fill="hold">
+                                          <p:stCondLst>
+                                            <p:cond delay="0"/>
+                                          </p:stCondLst>
+                                        </p:cTn>
+                                        <p:tgtEl>
+                                          <p:spTgt spid="16"/>
+                                        </p:tgtEl>
+                                        <p:attrNameLst>
+                                          <p:attrName>style.visibility</p:attrName>
+                                        </p:attrNameLst>
+                                      </p:cBhvr>
+                                      <p:to>
+                                        <p:strVal val="visible"/>
+                                      </p:to>
+                                    </p:set>
+                                  </p:childTnLst>
+                                </p:cTn>
+                              </p:par>
+                              <p:par>
+                                <p:cTn id="37" presetID="1" presetClass="entr" presetSubtype="0" fill="hold" grpId="0" nodeType="withEffect">
+                                  <p:stCondLst>
+                                    <p:cond delay="0"/>
+                                  </p:stCondLst>
+                                  <p:childTnLst>
+                                    <p:set>
+                                      <p:cBhvr>
+                                        <p:cTn id="38" dur="1" fill="hold">
+                                          <p:stCondLst>
+                                            <p:cond delay="0"/>
+                                          </p:stCondLst>
+                                        </p:cTn>
+                                        <p:tgtEl>
+                                          <p:spTgt spid="19"/>
+                                        </p:tgtEl>
+                                        <p:attrNameLst>
+                                          <p:attrName>style.visibility</p:attrName>
+                                        </p:attrNameLst>
+                                      </p:cBhvr>
+                                      <p:to>
+                                        <p:strVal val="visible"/>
+                                      </p:to>
+                                    </p:set>
+                                  </p:childTnLst>
+                                </p:cTn>
+                              </p:par>
+                              <p:par>
+                                <p:cTn id="39" presetID="1" presetClass="entr" presetSubtype="0" fill="hold" nodeType="withEffect">
+                                  <p:stCondLst>
+                                    <p:cond delay="0"/>
+                                  </p:stCondLst>
+                                  <p:childTnLst>
+                                    <p:set>
+                                      <p:cBhvr>
+                                        <p:cTn id="40" dur="1" fill="hold">
+                                          <p:stCondLst>
+                                            <p:cond delay="0"/>
+                                          </p:stCondLst>
+                                        </p:cTn>
+                                        <p:tgtEl>
+                                          <p:spTgt spid="17"/>
+                                        </p:tgtEl>
+                                        <p:attrNameLst>
+                                          <p:attrName>style.visibility</p:attrName>
+                                        </p:attrNameLst>
+                                      </p:cBhvr>
+                                      <p:to>
+                                        <p:strVal val="visible"/>
+                                      </p:to>
+                                    </p:set>
+                                  </p:childTnLst>
+                                </p:cTn>
+                              </p:par>
+                            </p:childTnLst>
+                          </p:cTn>
+                        </p:par>
+                      </p:childTnLst>
+                    </p:cTn>
+                  </p:par>
+                  <p:par>
+                    <p:cTn id="41" fill="hold">
+                      <p:stCondLst>
+                        <p:cond delay="indefinite"/>
+                      </p:stCondLst>
+                      <p:childTnLst>
+                        <p:par>
+                          <p:cTn id="42" fill="hold">
+                            <p:stCondLst>
+                              <p:cond delay="0"/>
+                            </p:stCondLst>
+                            <p:childTnLst>
+                              <p:par>
+                                <p:cTn id="43" presetID="1" presetClass="entr" presetSubtype="0" fill="hold" nodeType="clickEffect">
+                                  <p:stCondLst>
+                                    <p:cond delay="0"/>
+                                  </p:stCondLst>
+                                  <p:childTnLst>
+                                    <p:set>
+                                      <p:cBhvr>
+                                        <p:cTn id="44" dur="1" fill="hold">
+                                          <p:stCondLst>
+                                            <p:cond delay="0"/>
+                                          </p:stCondLst>
+                                        </p:cTn>
+                                        <p:tgtEl>
+                                          <p:spTgt spid="23"/>
+                                        </p:tgtEl>
+                                        <p:attrNameLst>
+                                          <p:attrName>style.visibility</p:attrName>
+                                        </p:attrNameLst>
+                                      </p:cBhvr>
+                                      <p:to>
+                                        <p:strVal val="visible"/>
+                                      </p:to>
+                                    </p:set>
+                                  </p:childTnLst>
+                                </p:cTn>
+                              </p:par>
+                              <p:par>
+                                <p:cTn id="45" presetID="1" presetClass="entr" presetSubtype="0" fill="hold" grpId="0" nodeType="withEffect">
+                                  <p:stCondLst>
+                                    <p:cond delay="0"/>
+                                  </p:stCondLst>
+                                  <p:childTnLst>
+                                    <p:set>
+                                      <p:cBhvr>
+                                        <p:cTn id="46" dur="1" fill="hold">
+                                          <p:stCondLst>
+                                            <p:cond delay="0"/>
+                                          </p:stCondLst>
+                                        </p:cTn>
+                                        <p:tgtEl>
+                                          <p:spTgt spid="27"/>
+                                        </p:tgtEl>
+                                        <p:attrNameLst>
+                                          <p:attrName>style.visibility</p:attrName>
+                                        </p:attrNameLst>
+                                      </p:cBhvr>
+                                      <p:to>
+                                        <p:strVal val="visible"/>
+                                      </p:to>
+                                    </p:set>
+                                  </p:childTnLst>
+                                </p:cTn>
+                              </p:par>
+                              <p:par>
+                                <p:cTn id="47" presetID="1" presetClass="entr" presetSubtype="0" fill="hold" nodeType="withEffect">
+                                  <p:stCondLst>
+                                    <p:cond delay="0"/>
+                                  </p:stCondLst>
+                                  <p:childTnLst>
+                                    <p:set>
+                                      <p:cBhvr>
+                                        <p:cTn id="48" dur="1" fill="hold">
+                                          <p:stCondLst>
+                                            <p:cond delay="0"/>
+                                          </p:stCondLst>
+                                        </p:cTn>
+                                        <p:tgtEl>
+                                          <p:spTgt spid="25"/>
+                                        </p:tgtEl>
+                                        <p:attrNameLst>
+                                          <p:attrName>style.visibility</p:attrName>
+                                        </p:attrNameLst>
+                                      </p:cBhvr>
+                                      <p:to>
+                                        <p:strVal val="visible"/>
+                                      </p:to>
+                                    </p:set>
+                                  </p:childTnLst>
+                                </p:cTn>
+                              </p:par>
+                            </p:childTnLst>
+                          </p:cTn>
+                        </p:par>
+                      </p:childTnLst>
+                    </p:cTn>
+                  </p:par>
+                  <p:par>
+                    <p:cTn id="49" fill="hold">
+                      <p:stCondLst>
+                        <p:cond delay="indefinite"/>
+                      </p:stCondLst>
+                      <p:childTnLst>
+                        <p:par>
+                          <p:cTn id="50" fill="hold">
+                            <p:stCondLst>
+                              <p:cond delay="0"/>
+                            </p:stCondLst>
+                            <p:childTnLst>
+                              <p:par>
+                                <p:cTn id="51" presetID="1" presetClass="entr" presetSubtype="0" fill="hold" nodeType="clickEffect">
+                                  <p:stCondLst>
+                                    <p:cond delay="0"/>
+                                  </p:stCondLst>
+                                  <p:childTnLst>
+                                    <p:set>
+                                      <p:cBhvr>
+                                        <p:cTn id="52" dur="1" fill="hold">
+                                          <p:stCondLst>
+                                            <p:cond delay="0"/>
+                                          </p:stCondLst>
+                                        </p:cTn>
+                                        <p:tgtEl>
+                                          <p:spTgt spid="28"/>
+                                        </p:tgtEl>
+                                        <p:attrNameLst>
+                                          <p:attrName>style.visibility</p:attrName>
+                                        </p:attrNameLst>
+                                      </p:cBhvr>
+                                      <p:to>
+                                        <p:strVal val="visible"/>
+                                      </p:to>
+                                    </p:set>
+                                  </p:childTnLst>
+                                </p:cTn>
+                              </p:par>
+                              <p:par>
+                                <p:cTn id="53" presetID="1" presetClass="entr" presetSubtype="0" fill="hold" nodeType="withEffect">
+                                  <p:stCondLst>
+                                    <p:cond delay="0"/>
+                                  </p:stCondLst>
+                                  <p:childTnLst>
+                                    <p:set>
+                                      <p:cBhvr>
+                                        <p:cTn id="54" dur="1" fill="hold">
+                                          <p:stCondLst>
+                                            <p:cond delay="0"/>
+                                          </p:stCondLst>
+                                        </p:cTn>
+                                        <p:tgtEl>
+                                          <p:spTgt spid="30"/>
+                                        </p:tgtEl>
+                                        <p:attrNameLst>
+                                          <p:attrName>style.visibility</p:attrName>
+                                        </p:attrNameLst>
+                                      </p:cBhvr>
+                                      <p:to>
+                                        <p:strVal val="visible"/>
+                                      </p:to>
+                                    </p:set>
+                                  </p:childTnLst>
+                                </p:cTn>
+                              </p:par>
+                              <p:par>
+                                <p:cTn id="55" presetID="1" presetClass="entr" presetSubtype="0" fill="hold" nodeType="withEffect">
+                                  <p:stCondLst>
+                                    <p:cond delay="0"/>
+                                  </p:stCondLst>
+                                  <p:childTnLst>
+                                    <p:set>
+                                      <p:cBhvr>
+                                        <p:cTn id="56" dur="1" fill="hold">
+                                          <p:stCondLst>
+                                            <p:cond delay="0"/>
+                                          </p:stCondLst>
+                                        </p:cTn>
+                                        <p:tgtEl>
+                                          <p:spTgt spid="31"/>
+                                        </p:tgtEl>
+                                        <p:attrNameLst>
+                                          <p:attrName>style.visibility</p:attrName>
+                                        </p:attrNameLst>
+                                      </p:cBhvr>
+                                      <p:to>
+                                        <p:strVal val="visible"/>
+                                      </p:to>
+                                    </p:set>
+                                  </p:childTnLst>
+                                </p:cTn>
+                              </p:par>
+                              <p:par>
+                                <p:cTn id="57" presetID="1" presetClass="entr" presetSubtype="0" fill="hold" nodeType="withEffect">
+                                  <p:stCondLst>
+                                    <p:cond delay="0"/>
+                                  </p:stCondLst>
+                                  <p:childTnLst>
+                                    <p:set>
+                                      <p:cBhvr>
+                                        <p:cTn id="58" dur="1" fill="hold">
+                                          <p:stCondLst>
+                                            <p:cond delay="0"/>
+                                          </p:stCondLst>
+                                        </p:cTn>
+                                        <p:tgtEl>
+                                          <p:spTgt spid="33"/>
+                                        </p:tgtEl>
+                                        <p:attrNameLst>
+                                          <p:attrName>style.visibility</p:attrName>
+                                        </p:attrNameLst>
+                                      </p:cBhvr>
+                                      <p:to>
+                                        <p:strVal val="visible"/>
+                                      </p:to>
+                                    </p:set>
+                                  </p:childTnLst>
+                                </p:cTn>
+                              </p:par>
+                              <p:par>
+                                <p:cTn id="59" presetID="1" presetClass="entr" presetSubtype="0" fill="hold" nodeType="withEffect">
+                                  <p:stCondLst>
+                                    <p:cond delay="0"/>
+                                  </p:stCondLst>
+                                  <p:childTnLst>
+                                    <p:set>
+                                      <p:cBhvr>
+                                        <p:cTn id="60" dur="1" fill="hold">
+                                          <p:stCondLst>
+                                            <p:cond delay="0"/>
+                                          </p:stCondLst>
+                                        </p:cTn>
+                                        <p:tgtEl>
+                                          <p:spTgt spid="36"/>
+                                        </p:tgtEl>
+                                        <p:attrNameLst>
+                                          <p:attrName>style.visibility</p:attrName>
+                                        </p:attrNameLst>
+                                      </p:cBhvr>
+                                      <p:to>
+                                        <p:strVal val="visible"/>
+                                      </p:to>
+                                    </p:set>
+                                  </p:childTnLst>
+                                </p:cTn>
+                              </p:par>
+                              <p:par>
+                                <p:cTn id="61" presetID="1" presetClass="entr" presetSubtype="0" fill="hold" nodeType="withEffect">
+                                  <p:stCondLst>
+                                    <p:cond delay="0"/>
+                                  </p:stCondLst>
+                                  <p:childTnLst>
+                                    <p:set>
+                                      <p:cBhvr>
+                                        <p:cTn id="62" dur="1" fill="hold">
+                                          <p:stCondLst>
+                                            <p:cond delay="0"/>
+                                          </p:stCondLst>
+                                        </p:cTn>
+                                        <p:tgtEl>
+                                          <p:spTgt spid="38"/>
+                                        </p:tgtEl>
+                                        <p:attrNameLst>
+                                          <p:attrName>style.visibility</p:attrName>
+                                        </p:attrNameLst>
+                                      </p:cBhvr>
+                                      <p:to>
+                                        <p:strVal val="visible"/>
+                                      </p:to>
+                                    </p:set>
+                                  </p:childTnLst>
+                                </p:cTn>
+                              </p:par>
+                              <p:par>
+                                <p:cTn id="63" presetID="1" presetClass="entr" presetSubtype="0" fill="hold" grpId="0" nodeType="withEffect">
+                                  <p:stCondLst>
+                                    <p:cond delay="0"/>
+                                  </p:stCondLst>
+                                  <p:childTnLst>
+                                    <p:set>
+                                      <p:cBhvr>
+                                        <p:cTn id="64" dur="1" fill="hold">
+                                          <p:stCondLst>
+                                            <p:cond delay="0"/>
+                                          </p:stCondLst>
+                                        </p:cTn>
+                                        <p:tgtEl>
+                                          <p:spTgt spid="57"/>
+                                        </p:tgtEl>
+                                        <p:attrNameLst>
+                                          <p:attrName>style.visibility</p:attrName>
+                                        </p:attrNameLst>
+                                      </p:cBhvr>
+                                      <p:to>
+                                        <p:strVal val="visible"/>
+                                      </p:to>
+                                    </p:set>
+                                  </p:childTnLst>
+                                </p:cTn>
+                              </p:par>
+                            </p:childTnLst>
+                          </p:cTn>
+                        </p:par>
+                      </p:childTnLst>
+                    </p:cTn>
+                  </p:par>
+                  <p:par>
+                    <p:cTn id="65" fill="hold">
+                      <p:stCondLst>
+                        <p:cond delay="indefinite"/>
+                      </p:stCondLst>
+                      <p:childTnLst>
+                        <p:par>
+                          <p:cTn id="66" fill="hold">
+                            <p:stCondLst>
+                              <p:cond delay="0"/>
+                            </p:stCondLst>
+                            <p:childTnLst>
+                              <p:par>
+                                <p:cTn id="67" presetID="1" presetClass="entr" presetSubtype="0" fill="hold" nodeType="clickEffect">
+                                  <p:stCondLst>
+                                    <p:cond delay="0"/>
+                                  </p:stCondLst>
+                                  <p:childTnLst>
+                                    <p:set>
+                                      <p:cBhvr>
+                                        <p:cTn id="68" dur="1" fill="hold">
+                                          <p:stCondLst>
+                                            <p:cond delay="0"/>
+                                          </p:stCondLst>
+                                        </p:cTn>
+                                        <p:tgtEl>
+                                          <p:spTgt spid="41"/>
+                                        </p:tgtEl>
+                                        <p:attrNameLst>
+                                          <p:attrName>style.visibility</p:attrName>
+                                        </p:attrNameLst>
+                                      </p:cBhvr>
+                                      <p:to>
+                                        <p:strVal val="visible"/>
+                                      </p:to>
+                                    </p:set>
+                                  </p:childTnLst>
+                                </p:cTn>
+                              </p:par>
+                              <p:par>
+                                <p:cTn id="69" presetID="1" presetClass="entr" presetSubtype="0" fill="hold" grpId="0" nodeType="withEffect">
+                                  <p:stCondLst>
+                                    <p:cond delay="0"/>
+                                  </p:stCondLst>
+                                  <p:childTnLst>
+                                    <p:set>
+                                      <p:cBhvr>
+                                        <p:cTn id="70" dur="1" fill="hold">
+                                          <p:stCondLst>
+                                            <p:cond delay="0"/>
+                                          </p:stCondLst>
+                                        </p:cTn>
+                                        <p:tgtEl>
+                                          <p:spTgt spid="49"/>
+                                        </p:tgtEl>
+                                        <p:attrNameLst>
+                                          <p:attrName>style.visibility</p:attrName>
+                                        </p:attrNameLst>
+                                      </p:cBhvr>
+                                      <p:to>
+                                        <p:strVal val="visible"/>
+                                      </p:to>
+                                    </p:set>
+                                  </p:childTnLst>
+                                </p:cTn>
+                              </p:par>
+                              <p:par>
+                                <p:cTn id="71" presetID="1" presetClass="entr" presetSubtype="0" fill="hold" nodeType="withEffect">
+                                  <p:stCondLst>
+                                    <p:cond delay="0"/>
+                                  </p:stCondLst>
+                                  <p:childTnLst>
+                                    <p:set>
+                                      <p:cBhvr>
+                                        <p:cTn id="72" dur="1" fill="hold">
+                                          <p:stCondLst>
+                                            <p:cond delay="0"/>
+                                          </p:stCondLst>
+                                        </p:cTn>
+                                        <p:tgtEl>
+                                          <p:spTgt spid="47"/>
+                                        </p:tgtEl>
+                                        <p:attrNameLst>
+                                          <p:attrName>style.visibility</p:attrName>
+                                        </p:attrNameLst>
+                                      </p:cBhvr>
+                                      <p:to>
+                                        <p:strVal val="visible"/>
+                                      </p:to>
+                                    </p:set>
+                                  </p:childTnLst>
+                                </p:cTn>
+                              </p:par>
+                            </p:childTnLst>
+                          </p:cTn>
+                        </p:par>
+                      </p:childTnLst>
+                    </p:cTn>
+                  </p:par>
+                  <p:par>
+                    <p:cTn id="73" fill="hold">
+                      <p:stCondLst>
+                        <p:cond delay="indefinite"/>
+                      </p:stCondLst>
+                      <p:childTnLst>
+                        <p:par>
+                          <p:cTn id="74" fill="hold">
+                            <p:stCondLst>
+                              <p:cond delay="0"/>
+                            </p:stCondLst>
+                            <p:childTnLst>
+                              <p:par>
+                                <p:cTn id="75" presetID="1" presetClass="entr" presetSubtype="0" fill="hold" nodeType="clickEffect">
+                                  <p:stCondLst>
+                                    <p:cond delay="0"/>
+                                  </p:stCondLst>
+                                  <p:childTnLst>
+                                    <p:set>
+                                      <p:cBhvr>
+                                        <p:cTn id="76" dur="1" fill="hold">
+                                          <p:stCondLst>
+                                            <p:cond delay="0"/>
+                                          </p:stCondLst>
+                                        </p:cTn>
+                                        <p:tgtEl>
+                                          <p:spTgt spid="55"/>
+                                        </p:tgtEl>
+                                        <p:attrNameLst>
+                                          <p:attrName>style.visibility</p:attrName>
+                                        </p:attrNameLst>
+                                      </p:cBhvr>
+                                      <p:to>
+                                        <p:strVal val="visible"/>
+                                      </p:to>
+                                    </p:set>
+                                  </p:childTnLst>
+                                </p:cTn>
+                              </p:par>
+                            </p:childTnLst>
+                          </p:cTn>
+                        </p:par>
+                      </p:childTnLst>
+                    </p:cTn>
+                  </p:par>
+                  <p:par>
+                    <p:cTn id="77" fill="hold">
+                      <p:stCondLst>
+                        <p:cond delay="indefinite"/>
+                      </p:stCondLst>
+                      <p:childTnLst>
+                        <p:par>
+                          <p:cTn id="78" fill="hold">
+                            <p:stCondLst>
+                              <p:cond delay="0"/>
+                            </p:stCondLst>
+                            <p:childTnLst>
+                              <p:par>
+                                <p:cTn id="79" presetID="1" presetClass="entr" presetSubtype="0" fill="hold" nodeType="clickEffect">
+                                  <p:stCondLst>
+                                    <p:cond delay="0"/>
+                                  </p:stCondLst>
+                                  <p:childTnLst>
+                                    <p:set>
+                                      <p:cBhvr>
+                                        <p:cTn id="80" dur="1" fill="hold">
+                                          <p:stCondLst>
+                                            <p:cond delay="0"/>
+                                          </p:stCondLst>
+                                        </p:cTn>
+                                        <p:tgtEl>
+                                          <p:spTgt spid="60"/>
+                                        </p:tgtEl>
+                                        <p:attrNameLst>
+                                          <p:attrName>style.visibility</p:attrName>
+                                        </p:attrNameLst>
+                                      </p:cBhvr>
+                                      <p:to>
+                                        <p:strVal val="visible"/>
+                                      </p:to>
+                                    </p:set>
+                                  </p:childTnLst>
+                                </p:cTn>
+                              </p:par>
+                              <p:par>
+                                <p:cTn id="81" presetID="1" presetClass="entr" presetSubtype="0" fill="hold" nodeType="withEffect">
+                                  <p:stCondLst>
+                                    <p:cond delay="0"/>
+                                  </p:stCondLst>
+                                  <p:childTnLst>
+                                    <p:set>
+                                      <p:cBhvr>
+                                        <p:cTn id="82" dur="1" fill="hold">
+                                          <p:stCondLst>
+                                            <p:cond delay="0"/>
+                                          </p:stCondLst>
+                                        </p:cTn>
+                                        <p:tgtEl>
+                                          <p:spTgt spid="65"/>
+                                        </p:tgtEl>
+                                        <p:attrNameLst>
+                                          <p:attrName>style.visibility</p:attrName>
+                                        </p:attrNameLst>
+                                      </p:cBhvr>
+                                      <p:to>
+                                        <p:strVal val="visible"/>
+                                      </p:to>
+                                    </p:set>
+                                  </p:childTnLst>
+                                </p:cTn>
+                              </p:par>
+                              <p:par>
+                                <p:cTn id="83" presetID="1" presetClass="entr" presetSubtype="0" fill="hold" nodeType="withEffect">
+                                  <p:stCondLst>
+                                    <p:cond delay="0"/>
+                                  </p:stCondLst>
+                                  <p:childTnLst>
+                                    <p:set>
+                                      <p:cBhvr>
+                                        <p:cTn id="84" dur="1" fill="hold">
+                                          <p:stCondLst>
+                                            <p:cond delay="0"/>
+                                          </p:stCondLst>
+                                        </p:cTn>
+                                        <p:tgtEl>
+                                          <p:spTgt spid="58"/>
+                                        </p:tgtEl>
+                                        <p:attrNameLst>
+                                          <p:attrName>style.visibility</p:attrName>
+                                        </p:attrNameLst>
+                                      </p:cBhvr>
+                                      <p:to>
+                                        <p:strVal val="visible"/>
+                                      </p:to>
+                                    </p:set>
+                                  </p:childTnLst>
+                                </p:cTn>
+                              </p:par>
+                              <p:par>
+                                <p:cTn id="85" presetID="1" presetClass="entr" presetSubtype="0" fill="hold" grpId="0" nodeType="withEffect">
+                                  <p:stCondLst>
+                                    <p:cond delay="0"/>
+                                  </p:stCondLst>
+                                  <p:childTnLst>
+                                    <p:set>
+                                      <p:cBhvr>
+                                        <p:cTn id="86" dur="1" fill="hold">
+                                          <p:stCondLst>
+                                            <p:cond delay="0"/>
+                                          </p:stCondLst>
+                                        </p:cTn>
+                                        <p:tgtEl>
+                                          <p:spTgt spid="81"/>
+                                        </p:tgtEl>
+                                        <p:attrNameLst>
+                                          <p:attrName>style.visibility</p:attrName>
+                                        </p:attrNameLst>
+                                      </p:cBhvr>
+                                      <p:to>
+                                        <p:strVal val="visible"/>
+                                      </p:to>
+                                    </p:set>
+                                  </p:childTnLst>
+                                </p:cTn>
+                              </p:par>
+                            </p:childTnLst>
+                          </p:cTn>
+                        </p:par>
+                      </p:childTnLst>
+                    </p:cTn>
+                  </p:par>
+                  <p:par>
+                    <p:cTn id="87" fill="hold">
+                      <p:stCondLst>
+                        <p:cond delay="indefinite"/>
+                      </p:stCondLst>
+                      <p:childTnLst>
+                        <p:par>
+                          <p:cTn id="88" fill="hold">
+                            <p:stCondLst>
+                              <p:cond delay="0"/>
+                            </p:stCondLst>
+                            <p:childTnLst>
+                              <p:par>
+                                <p:cTn id="89" presetID="1" presetClass="entr" presetSubtype="0" fill="hold" nodeType="clickEffect">
+                                  <p:stCondLst>
+                                    <p:cond delay="0"/>
+                                  </p:stCondLst>
+                                  <p:childTnLst>
+                                    <p:set>
+                                      <p:cBhvr>
+                                        <p:cTn id="90" dur="1" fill="hold">
+                                          <p:stCondLst>
+                                            <p:cond delay="0"/>
+                                          </p:stCondLst>
+                                        </p:cTn>
+                                        <p:tgtEl>
+                                          <p:spTgt spid="78"/>
+                                        </p:tgtEl>
+                                        <p:attrNameLst>
+                                          <p:attrName>style.visibility</p:attrName>
+                                        </p:attrNameLst>
+                                      </p:cBhvr>
+                                      <p:to>
+                                        <p:strVal val="visible"/>
+                                      </p:to>
+                                    </p:set>
+                                  </p:childTnLst>
+                                </p:cTn>
+                              </p:par>
+                              <p:par>
+                                <p:cTn id="91" presetID="1" presetClass="entr" presetSubtype="0" fill="hold" nodeType="withEffect">
+                                  <p:stCondLst>
+                                    <p:cond delay="0"/>
+                                  </p:stCondLst>
+                                  <p:childTnLst>
+                                    <p:set>
+                                      <p:cBhvr>
+                                        <p:cTn id="92" dur="1" fill="hold">
+                                          <p:stCondLst>
+                                            <p:cond delay="0"/>
+                                          </p:stCondLst>
+                                        </p:cTn>
+                                        <p:tgtEl>
+                                          <p:spTgt spid="79"/>
+                                        </p:tgtEl>
+                                        <p:attrNameLst>
+                                          <p:attrName>style.visibility</p:attrName>
+                                        </p:attrNameLst>
+                                      </p:cBhvr>
+                                      <p:to>
+                                        <p:strVal val="visible"/>
+                                      </p:to>
+                                    </p:set>
+                                  </p:childTnLst>
+                                </p:cTn>
+                              </p:par>
+                              <p:par>
+                                <p:cTn id="93" presetID="1" presetClass="entr" presetSubtype="0" fill="hold" grpId="0" nodeType="withEffect">
+                                  <p:stCondLst>
+                                    <p:cond delay="0"/>
+                                  </p:stCondLst>
+                                  <p:childTnLst>
+                                    <p:set>
+                                      <p:cBhvr>
+                                        <p:cTn id="94" dur="1" fill="hold">
+                                          <p:stCondLst>
+                                            <p:cond delay="0"/>
+                                          </p:stCondLst>
+                                        </p:cTn>
+                                        <p:tgtEl>
+                                          <p:spTgt spid="80"/>
+                                        </p:tgtEl>
+                                        <p:attrNameLst>
+                                          <p:attrName>style.visibility</p:attrName>
+                                        </p:attrNameLst>
+                                      </p:cBhvr>
+                                      <p:to>
+                                        <p:strVal val="visible"/>
+                                      </p:to>
+                                    </p:set>
+                                  </p:childTnLst>
+                                </p:cTn>
+                              </p:par>
+                              <p:par>
+                                <p:cTn id="95" presetID="1" presetClass="entr" presetSubtype="0" fill="hold" nodeType="withEffect">
+                                  <p:stCondLst>
+                                    <p:cond delay="0"/>
+                                  </p:stCondLst>
+                                  <p:childTnLst>
+                                    <p:set>
+                                      <p:cBhvr>
+                                        <p:cTn id="96" dur="1" fill="hold">
+                                          <p:stCondLst>
+                                            <p:cond delay="0"/>
+                                          </p:stCondLst>
+                                        </p:cTn>
+                                        <p:tgtEl>
+                                          <p:spTgt spid="59"/>
+                                        </p:tgtEl>
+                                        <p:attrNameLst>
+                                          <p:attrName>style.visibility</p:attrName>
+                                        </p:attrNameLst>
+                                      </p:cBhvr>
+                                      <p:to>
+                                        <p:strVal val="visible"/>
+                                      </p:to>
+                                    </p:set>
+                                  </p:childTnLst>
+                                </p:cTn>
+                              </p:par>
+                            </p:childTnLst>
+                          </p:cTn>
+                        </p:par>
+                      </p:childTnLst>
+                    </p:cTn>
+                  </p:par>
+                </p:childTnLst>
+              </p:cTn>
+              <p:prevCondLst>
+                <p:cond evt="onPrev" delay="0">
+                  <p:tgtEl>
+                    <p:sldTgt/>
+                  </p:tgtEl>
+                </p:cond>
+              </p:prevCondLst>
+              <p:nextCondLst>
+                <p:cond evt="onNext" delay="0">
+                  <p:tgtEl>
+                    <p:sldTgt/>
+                  </p:tgtEl>
+                </p:cond>
+              </p:nextCondLst>
+            </p:seq>
+          </p:childTnLst>
+        </p:cTn>
+      </p:par>
+    </p:tnLst>
+    <p:bldLst>
+      <p:bldP spid="57" grpId="0" animBg="1"/>
+      <p:bldP spid="10" grpId="0"/>
+      <p:bldP spid="19" grpId="0"/>
+      <p:bldP spid="27" grpId="0"/>
+      <p:bldP spid="45" grpId="0"/>
+      <p:bldP spid="49" grpId="0"/>
+      <p:bldP spid="80" grpId="0"/>
+      <p:bldP spid="81" grpId="0"/>
+    </p:bldLst>
+  </p:timing>
+</p:sld>
+</file>
+
+<file path=ppt/slides/slide15.xml><?xml version="1.0" encoding="utf-8"?>
+<p:sld xmlns:a="http://schemas.openxmlformats.org/drawingml/2006/main" xmlns:r="http://schemas.openxmlformats.org/officeDocument/2006/relationships" xmlns:p="http://schemas.openxmlformats.org/presentationml/2006/main">
+  <p:cSld>
+    <p:spTree>
+      <p:nvGrpSpPr>
+        <p:cNvPr id="1" name=""/>
+        <p:cNvGrpSpPr/>
+        <p:nvPr/>
+      </p:nvGrpSpPr>
+      <p:grpSpPr>
+        <a:xfrm>
+          <a:off x="0" y="0"/>
+          <a:ext cx="0" cy="0"/>
+          <a:chOff x="0" y="0"/>
+          <a:chExt cx="0" cy="0"/>
+        </a:xfrm>
+      </p:grpSpPr>
+      <p:sp>
+        <p:nvSpPr>
           <p:cNvPr id="3" name="Content Placeholder 2">
             <a:extLst>
               <a:ext uri="{FF2B5EF4-FFF2-40B4-BE49-F238E27FC236}">
@@ -9806,7 +12380,7 @@
 </p:sld>
 </file>
 
-<file path=ppt/slides/slide15.xml><?xml version="1.0" encoding="utf-8"?>
+<file path=ppt/slides/slide16.xml><?xml version="1.0" encoding="utf-8"?>
 <p:sld xmlns:a="http://schemas.openxmlformats.org/drawingml/2006/main" xmlns:r="http://schemas.openxmlformats.org/officeDocument/2006/relationships" xmlns:p="http://schemas.openxmlformats.org/presentationml/2006/main">
   <p:cSld>
     <p:spTree>
@@ -10004,7 +12578,7 @@
 </p:sld>
 </file>
 
-<file path=ppt/slides/slide16.xml><?xml version="1.0" encoding="utf-8"?>
+<file path=ppt/slides/slide17.xml><?xml version="1.0" encoding="utf-8"?>
 <p:sld xmlns:a="http://schemas.openxmlformats.org/drawingml/2006/main" xmlns:r="http://schemas.openxmlformats.org/officeDocument/2006/relationships" xmlns:p="http://schemas.openxmlformats.org/presentationml/2006/main">
   <p:cSld>
     <p:spTree>
@@ -10124,7 +12698,7 @@
 </p:sld>
 </file>
 
-<file path=ppt/slides/slide17.xml><?xml version="1.0" encoding="utf-8"?>
+<file path=ppt/slides/slide18.xml><?xml version="1.0" encoding="utf-8"?>
 <p:sld xmlns:a="http://schemas.openxmlformats.org/drawingml/2006/main" xmlns:r="http://schemas.openxmlformats.org/officeDocument/2006/relationships" xmlns:p="http://schemas.openxmlformats.org/presentationml/2006/main">
   <p:cSld>
     <p:spTree>
@@ -10332,7 +12906,7 @@
 </p:sld>
 </file>
 
-<file path=ppt/slides/slide18.xml><?xml version="1.0" encoding="utf-8"?>
+<file path=ppt/slides/slide19.xml><?xml version="1.0" encoding="utf-8"?>
 <p:sld xmlns:a="http://schemas.openxmlformats.org/drawingml/2006/main" xmlns:r="http://schemas.openxmlformats.org/officeDocument/2006/relationships" xmlns:p="http://schemas.openxmlformats.org/presentationml/2006/main">
   <p:cSld>
     <p:spTree>
@@ -10422,7 +12996,206 @@
 </p:sld>
 </file>
 
-<file path=ppt/slides/slide19.xml><?xml version="1.0" encoding="utf-8"?>
+<file path=ppt/slides/slide2.xml><?xml version="1.0" encoding="utf-8"?>
+<p:sld xmlns:a="http://schemas.openxmlformats.org/drawingml/2006/main" xmlns:r="http://schemas.openxmlformats.org/officeDocument/2006/relationships" xmlns:p="http://schemas.openxmlformats.org/presentationml/2006/main">
+  <p:cSld>
+    <p:spTree>
+      <p:nvGrpSpPr>
+        <p:cNvPr id="1" name=""/>
+        <p:cNvGrpSpPr/>
+        <p:nvPr/>
+      </p:nvGrpSpPr>
+      <p:grpSpPr>
+        <a:xfrm>
+          <a:off x="0" y="0"/>
+          <a:ext cx="0" cy="0"/>
+          <a:chOff x="0" y="0"/>
+          <a:chExt cx="0" cy="0"/>
+        </a:xfrm>
+      </p:grpSpPr>
+      <p:sp>
+        <p:nvSpPr>
+          <p:cNvPr id="2" name="Title 1">
+            <a:extLst>
+              <a:ext uri="{FF2B5EF4-FFF2-40B4-BE49-F238E27FC236}">
+                <a16:creationId xmlns:a16="http://schemas.microsoft.com/office/drawing/2014/main" id="{B608A94F-1FB4-4E7F-B744-9EB614523D84}"/>
+              </a:ext>
+            </a:extLst>
+          </p:cNvPr>
+          <p:cNvSpPr>
+            <a:spLocks noGrp="1"/>
+          </p:cNvSpPr>
+          <p:nvPr>
+            <p:ph type="title"/>
+          </p:nvPr>
+        </p:nvSpPr>
+        <p:spPr/>
+        <p:txBody>
+          <a:bodyPr/>
+          <a:lstStyle/>
+          <a:p>
+            <a:r>
+              <a:rPr lang="ro-RO" dirty="0"/>
+              <a:t>Cuprins</a:t>
+            </a:r>
+            <a:endParaRPr lang="en-US" dirty="0"/>
+          </a:p>
+        </p:txBody>
+      </p:sp>
+      <p:sp>
+        <p:nvSpPr>
+          <p:cNvPr id="3" name="Content Placeholder 2">
+            <a:extLst>
+              <a:ext uri="{FF2B5EF4-FFF2-40B4-BE49-F238E27FC236}">
+                <a16:creationId xmlns:a16="http://schemas.microsoft.com/office/drawing/2014/main" id="{2D78CA3C-7A9C-4F31-B041-79A887178553}"/>
+              </a:ext>
+            </a:extLst>
+          </p:cNvPr>
+          <p:cNvSpPr>
+            <a:spLocks noGrp="1"/>
+          </p:cNvSpPr>
+          <p:nvPr>
+            <p:ph idx="1"/>
+          </p:nvPr>
+        </p:nvSpPr>
+        <p:spPr/>
+        <p:txBody>
+          <a:bodyPr numCol="2">
+            <a:normAutofit/>
+          </a:bodyPr>
+          <a:lstStyle/>
+          <a:p>
+            <a:r>
+              <a:rPr lang="ro-RO" dirty="0"/>
+              <a:t>Context</a:t>
+            </a:r>
+          </a:p>
+          <a:p>
+            <a:r>
+              <a:rPr lang="ro-RO" dirty="0"/>
+              <a:t>Componentele unui </a:t>
+            </a:r>
+            <a:r>
+              <a:rPr lang="ro-RO" dirty="0" err="1"/>
+              <a:t>crawler</a:t>
+            </a:r>
+            <a:endParaRPr lang="ro-RO" dirty="0"/>
+          </a:p>
+          <a:p>
+            <a:r>
+              <a:rPr lang="ro-RO" dirty="0" err="1"/>
+              <a:t>Crawler-ul</a:t>
+            </a:r>
+            <a:r>
+              <a:rPr lang="ro-RO" dirty="0"/>
+              <a:t> web </a:t>
+            </a:r>
+            <a:r>
+              <a:rPr lang="en-US" i="1" dirty="0"/>
+              <a:t>“Surf”</a:t>
+            </a:r>
+          </a:p>
+          <a:p>
+            <a:r>
+              <a:rPr lang="en-US" dirty="0" err="1"/>
+              <a:t>Arhitectur</a:t>
+            </a:r>
+            <a:r>
+              <a:rPr lang="ro-RO" dirty="0"/>
+              <a:t>ă</a:t>
+            </a:r>
+            <a:endParaRPr lang="en-US" dirty="0"/>
+          </a:p>
+          <a:p>
+            <a:r>
+              <a:rPr lang="en-US" dirty="0"/>
+              <a:t>Securitate</a:t>
+            </a:r>
+          </a:p>
+          <a:p>
+            <a:r>
+              <a:rPr lang="en-US" dirty="0" err="1"/>
+              <a:t>Generarea</a:t>
+            </a:r>
+            <a:r>
+              <a:rPr lang="en-US" dirty="0"/>
+              <a:t> </a:t>
+            </a:r>
+            <a:r>
+              <a:rPr lang="en-US" dirty="0" err="1"/>
+              <a:t>infrastructurii</a:t>
+            </a:r>
+            <a:endParaRPr lang="ro-RO" dirty="0"/>
+          </a:p>
+          <a:p>
+            <a:r>
+              <a:rPr lang="ro-RO" dirty="0" err="1"/>
+              <a:t>Workflow</a:t>
+            </a:r>
+            <a:r>
+              <a:rPr lang="ro-RO" dirty="0"/>
+              <a:t>-uri de </a:t>
+            </a:r>
+            <a:r>
+              <a:rPr lang="ro-RO" dirty="0" err="1"/>
+              <a:t>crawling</a:t>
+            </a:r>
+            <a:endParaRPr lang="ro-RO" dirty="0"/>
+          </a:p>
+          <a:p>
+            <a:r>
+              <a:rPr lang="ro-RO" dirty="0"/>
+              <a:t>Interfața de programare</a:t>
+            </a:r>
+          </a:p>
+          <a:p>
+            <a:r>
+              <a:rPr lang="ro-RO" dirty="0"/>
+              <a:t>Performanță și </a:t>
+            </a:r>
+            <a:r>
+              <a:rPr lang="ro-RO" dirty="0" err="1"/>
+              <a:t>scalabilitate</a:t>
+            </a:r>
+            <a:endParaRPr lang="ro-RO" dirty="0"/>
+          </a:p>
+          <a:p>
+            <a:r>
+              <a:rPr lang="ro-RO" dirty="0"/>
+              <a:t>Direcții viitoare</a:t>
+            </a:r>
+            <a:endParaRPr lang="en-US" dirty="0"/>
+          </a:p>
+          <a:p>
+            <a:r>
+              <a:rPr lang="ro-RO" dirty="0"/>
+              <a:t>Contribuții personale</a:t>
+            </a:r>
+            <a:endParaRPr lang="en-US" dirty="0"/>
+          </a:p>
+          <a:p>
+            <a:r>
+              <a:rPr lang="ro-RO" dirty="0"/>
+              <a:t>Concluzii</a:t>
+            </a:r>
+            <a:endParaRPr lang="en-US" dirty="0"/>
+          </a:p>
+        </p:txBody>
+      </p:sp>
+    </p:spTree>
+    <p:extLst>
+      <p:ext uri="{BB962C8B-B14F-4D97-AF65-F5344CB8AC3E}">
+        <p14:creationId xmlns:p14="http://schemas.microsoft.com/office/powerpoint/2010/main" val="176370969"/>
+      </p:ext>
+    </p:extLst>
+  </p:cSld>
+  <p:clrMapOvr>
+    <a:masterClrMapping/>
+  </p:clrMapOvr>
+</p:sld>
+</file>
+
+<file path=ppt/slides/slide20.xml><?xml version="1.0" encoding="utf-8"?>
 <p:sld xmlns:a="http://schemas.openxmlformats.org/drawingml/2006/main" xmlns:r="http://schemas.openxmlformats.org/officeDocument/2006/relationships" xmlns:p="http://schemas.openxmlformats.org/presentationml/2006/main">
   <p:cSld>
     <p:spTree>
@@ -10669,206 +13442,7 @@
 </p:sld>
 </file>
 
-<file path=ppt/slides/slide2.xml><?xml version="1.0" encoding="utf-8"?>
-<p:sld xmlns:a="http://schemas.openxmlformats.org/drawingml/2006/main" xmlns:r="http://schemas.openxmlformats.org/officeDocument/2006/relationships" xmlns:p="http://schemas.openxmlformats.org/presentationml/2006/main">
-  <p:cSld>
-    <p:spTree>
-      <p:nvGrpSpPr>
-        <p:cNvPr id="1" name=""/>
-        <p:cNvGrpSpPr/>
-        <p:nvPr/>
-      </p:nvGrpSpPr>
-      <p:grpSpPr>
-        <a:xfrm>
-          <a:off x="0" y="0"/>
-          <a:ext cx="0" cy="0"/>
-          <a:chOff x="0" y="0"/>
-          <a:chExt cx="0" cy="0"/>
-        </a:xfrm>
-      </p:grpSpPr>
-      <p:sp>
-        <p:nvSpPr>
-          <p:cNvPr id="2" name="Title 1">
-            <a:extLst>
-              <a:ext uri="{FF2B5EF4-FFF2-40B4-BE49-F238E27FC236}">
-                <a16:creationId xmlns:a16="http://schemas.microsoft.com/office/drawing/2014/main" id="{B608A94F-1FB4-4E7F-B744-9EB614523D84}"/>
-              </a:ext>
-            </a:extLst>
-          </p:cNvPr>
-          <p:cNvSpPr>
-            <a:spLocks noGrp="1"/>
-          </p:cNvSpPr>
-          <p:nvPr>
-            <p:ph type="title"/>
-          </p:nvPr>
-        </p:nvSpPr>
-        <p:spPr/>
-        <p:txBody>
-          <a:bodyPr/>
-          <a:lstStyle/>
-          <a:p>
-            <a:r>
-              <a:rPr lang="ro-RO" dirty="0"/>
-              <a:t>Cuprins</a:t>
-            </a:r>
-            <a:endParaRPr lang="en-US" dirty="0"/>
-          </a:p>
-        </p:txBody>
-      </p:sp>
-      <p:sp>
-        <p:nvSpPr>
-          <p:cNvPr id="3" name="Content Placeholder 2">
-            <a:extLst>
-              <a:ext uri="{FF2B5EF4-FFF2-40B4-BE49-F238E27FC236}">
-                <a16:creationId xmlns:a16="http://schemas.microsoft.com/office/drawing/2014/main" id="{2D78CA3C-7A9C-4F31-B041-79A887178553}"/>
-              </a:ext>
-            </a:extLst>
-          </p:cNvPr>
-          <p:cNvSpPr>
-            <a:spLocks noGrp="1"/>
-          </p:cNvSpPr>
-          <p:nvPr>
-            <p:ph idx="1"/>
-          </p:nvPr>
-        </p:nvSpPr>
-        <p:spPr/>
-        <p:txBody>
-          <a:bodyPr numCol="2">
-            <a:normAutofit/>
-          </a:bodyPr>
-          <a:lstStyle/>
-          <a:p>
-            <a:r>
-              <a:rPr lang="ro-RO" dirty="0"/>
-              <a:t>Context</a:t>
-            </a:r>
-          </a:p>
-          <a:p>
-            <a:r>
-              <a:rPr lang="ro-RO" dirty="0"/>
-              <a:t>Componentele unui </a:t>
-            </a:r>
-            <a:r>
-              <a:rPr lang="ro-RO" dirty="0" err="1"/>
-              <a:t>crawler</a:t>
-            </a:r>
-            <a:endParaRPr lang="ro-RO" dirty="0"/>
-          </a:p>
-          <a:p>
-            <a:r>
-              <a:rPr lang="ro-RO" dirty="0" err="1"/>
-              <a:t>Crawler-ul</a:t>
-            </a:r>
-            <a:r>
-              <a:rPr lang="ro-RO" dirty="0"/>
-              <a:t> web </a:t>
-            </a:r>
-            <a:r>
-              <a:rPr lang="en-US" i="1" dirty="0"/>
-              <a:t>“Surf”</a:t>
-            </a:r>
-          </a:p>
-          <a:p>
-            <a:r>
-              <a:rPr lang="en-US" dirty="0" err="1"/>
-              <a:t>Arhitectur</a:t>
-            </a:r>
-            <a:r>
-              <a:rPr lang="ro-RO" dirty="0"/>
-              <a:t>ă</a:t>
-            </a:r>
-            <a:endParaRPr lang="en-US" dirty="0"/>
-          </a:p>
-          <a:p>
-            <a:r>
-              <a:rPr lang="en-US" dirty="0"/>
-              <a:t>Securitate</a:t>
-            </a:r>
-          </a:p>
-          <a:p>
-            <a:r>
-              <a:rPr lang="en-US" dirty="0" err="1"/>
-              <a:t>Generarea</a:t>
-            </a:r>
-            <a:r>
-              <a:rPr lang="en-US" dirty="0"/>
-              <a:t> </a:t>
-            </a:r>
-            <a:r>
-              <a:rPr lang="en-US" dirty="0" err="1"/>
-              <a:t>infrastructurii</a:t>
-            </a:r>
-            <a:endParaRPr lang="ro-RO" dirty="0"/>
-          </a:p>
-          <a:p>
-            <a:r>
-              <a:rPr lang="ro-RO" dirty="0" err="1"/>
-              <a:t>Workflow</a:t>
-            </a:r>
-            <a:r>
-              <a:rPr lang="ro-RO" dirty="0"/>
-              <a:t>-uri de </a:t>
-            </a:r>
-            <a:r>
-              <a:rPr lang="ro-RO" dirty="0" err="1"/>
-              <a:t>crawling</a:t>
-            </a:r>
-            <a:endParaRPr lang="ro-RO" dirty="0"/>
-          </a:p>
-          <a:p>
-            <a:r>
-              <a:rPr lang="ro-RO" dirty="0"/>
-              <a:t>Interfața de programare</a:t>
-            </a:r>
-          </a:p>
-          <a:p>
-            <a:r>
-              <a:rPr lang="ro-RO" dirty="0"/>
-              <a:t>Performanță și </a:t>
-            </a:r>
-            <a:r>
-              <a:rPr lang="ro-RO" dirty="0" err="1"/>
-              <a:t>scalabilitate</a:t>
-            </a:r>
-            <a:endParaRPr lang="ro-RO" dirty="0"/>
-          </a:p>
-          <a:p>
-            <a:r>
-              <a:rPr lang="ro-RO" dirty="0"/>
-              <a:t>Direcții viitoare</a:t>
-            </a:r>
-            <a:endParaRPr lang="en-US" dirty="0"/>
-          </a:p>
-          <a:p>
-            <a:r>
-              <a:rPr lang="ro-RO" dirty="0"/>
-              <a:t>Contribuții personale</a:t>
-            </a:r>
-            <a:endParaRPr lang="en-US" dirty="0"/>
-          </a:p>
-          <a:p>
-            <a:r>
-              <a:rPr lang="ro-RO" dirty="0"/>
-              <a:t>Concluzii</a:t>
-            </a:r>
-            <a:endParaRPr lang="en-US" dirty="0"/>
-          </a:p>
-        </p:txBody>
-      </p:sp>
-    </p:spTree>
-    <p:extLst>
-      <p:ext uri="{BB962C8B-B14F-4D97-AF65-F5344CB8AC3E}">
-        <p14:creationId xmlns:p14="http://schemas.microsoft.com/office/powerpoint/2010/main" val="176370969"/>
-      </p:ext>
-    </p:extLst>
-  </p:cSld>
-  <p:clrMapOvr>
-    <a:masterClrMapping/>
-  </p:clrMapOvr>
-</p:sld>
-</file>
-
-<file path=ppt/slides/slide20.xml><?xml version="1.0" encoding="utf-8"?>
+<file path=ppt/slides/slide21.xml><?xml version="1.0" encoding="utf-8"?>
 <p:sld xmlns:a="http://schemas.openxmlformats.org/drawingml/2006/main" xmlns:r="http://schemas.openxmlformats.org/officeDocument/2006/relationships" xmlns:p="http://schemas.openxmlformats.org/presentationml/2006/main">
   <p:cSld>
     <p:spTree>
@@ -10987,7 +13561,7 @@
 </p:sld>
 </file>
 
-<file path=ppt/slides/slide21.xml><?xml version="1.0" encoding="utf-8"?>
+<file path=ppt/slides/slide22.xml><?xml version="1.0" encoding="utf-8"?>
 <p:sld xmlns:a="http://schemas.openxmlformats.org/drawingml/2006/main" xmlns:r="http://schemas.openxmlformats.org/officeDocument/2006/relationships" xmlns:p="http://schemas.openxmlformats.org/presentationml/2006/main">
   <p:cSld>
     <p:spTree>
@@ -11264,7 +13838,7 @@
 </p:sld>
 </file>
 
-<file path=ppt/slides/slide22.xml><?xml version="1.0" encoding="utf-8"?>
+<file path=ppt/slides/slide23.xml><?xml version="1.0" encoding="utf-8"?>
 <p:sld xmlns:a="http://schemas.openxmlformats.org/drawingml/2006/main" xmlns:r="http://schemas.openxmlformats.org/officeDocument/2006/relationships" xmlns:p="http://schemas.openxmlformats.org/presentationml/2006/main">
   <p:cSld>
     <p:spTree>
@@ -11383,7 +13957,7 @@
 </p:sld>
 </file>
 
-<file path=ppt/slides/slide23.xml><?xml version="1.0" encoding="utf-8"?>
+<file path=ppt/slides/slide24.xml><?xml version="1.0" encoding="utf-8"?>
 <p:sld xmlns:a="http://schemas.openxmlformats.org/drawingml/2006/main" xmlns:r="http://schemas.openxmlformats.org/officeDocument/2006/relationships" xmlns:p="http://schemas.openxmlformats.org/presentationml/2006/main">
   <p:cSld>
     <p:spTree>
@@ -11668,164 +14242,6 @@
     <p:extLst>
       <p:ext uri="{BB962C8B-B14F-4D97-AF65-F5344CB8AC3E}">
         <p14:creationId xmlns:p14="http://schemas.microsoft.com/office/powerpoint/2010/main" val="2539157960"/>
-      </p:ext>
-    </p:extLst>
-  </p:cSld>
-  <p:clrMapOvr>
-    <a:masterClrMapping/>
-  </p:clrMapOvr>
-</p:sld>
-</file>
-
-<file path=ppt/slides/slide24.xml><?xml version="1.0" encoding="utf-8"?>
-<p:sld xmlns:a="http://schemas.openxmlformats.org/drawingml/2006/main" xmlns:r="http://schemas.openxmlformats.org/officeDocument/2006/relationships" xmlns:p="http://schemas.openxmlformats.org/presentationml/2006/main">
-  <p:cSld>
-    <p:spTree>
-      <p:nvGrpSpPr>
-        <p:cNvPr id="1" name=""/>
-        <p:cNvGrpSpPr/>
-        <p:nvPr/>
-      </p:nvGrpSpPr>
-      <p:grpSpPr>
-        <a:xfrm>
-          <a:off x="0" y="0"/>
-          <a:ext cx="0" cy="0"/>
-          <a:chOff x="0" y="0"/>
-          <a:chExt cx="0" cy="0"/>
-        </a:xfrm>
-      </p:grpSpPr>
-      <p:sp>
-        <p:nvSpPr>
-          <p:cNvPr id="6" name="Rectangle 5">
-            <a:extLst>
-              <a:ext uri="{FF2B5EF4-FFF2-40B4-BE49-F238E27FC236}">
-                <a16:creationId xmlns:a16="http://schemas.microsoft.com/office/drawing/2014/main" id="{191B9577-3A97-4821-91EA-83278043652F}"/>
-              </a:ext>
-            </a:extLst>
-          </p:cNvPr>
-          <p:cNvSpPr/>
-          <p:nvPr/>
-        </p:nvSpPr>
-        <p:spPr>
-          <a:xfrm>
-            <a:off x="-228600" y="-228600"/>
-            <a:ext cx="12630150" cy="7448550"/>
-          </a:xfrm>
-          <a:prstGeom prst="rect">
-            <a:avLst/>
-          </a:prstGeom>
-          <a:solidFill>
-            <a:schemeClr val="bg1"/>
-          </a:solidFill>
-          <a:ln>
-            <a:solidFill>
-              <a:schemeClr val="bg1"/>
-            </a:solidFill>
-          </a:ln>
-        </p:spPr>
-        <p:style>
-          <a:lnRef idx="2">
-            <a:schemeClr val="accent1">
-              <a:shade val="50000"/>
-            </a:schemeClr>
-          </a:lnRef>
-          <a:fillRef idx="1">
-            <a:schemeClr val="accent1"/>
-          </a:fillRef>
-          <a:effectRef idx="0">
-            <a:schemeClr val="accent1"/>
-          </a:effectRef>
-          <a:fontRef idx="minor">
-            <a:schemeClr val="lt1"/>
-          </a:fontRef>
-        </p:style>
-        <p:txBody>
-          <a:bodyPr rtlCol="0" anchor="ctr"/>
-          <a:lstStyle/>
-          <a:p>
-            <a:pPr algn="ctr"/>
-            <a:endParaRPr lang="en-US"/>
-          </a:p>
-        </p:txBody>
-      </p:sp>
-      <p:pic>
-        <p:nvPicPr>
-          <p:cNvPr id="5" name="Picture 4" descr="A screenshot of a cell phone&#10;&#10;Description generated with very high confidence">
-            <a:extLst>
-              <a:ext uri="{FF2B5EF4-FFF2-40B4-BE49-F238E27FC236}">
-                <a16:creationId xmlns:a16="http://schemas.microsoft.com/office/drawing/2014/main" id="{81B41BE1-1BF9-4169-9FAD-2DBE7F4D0C00}"/>
-              </a:ext>
-            </a:extLst>
-          </p:cNvPr>
-          <p:cNvPicPr>
-            <a:picLocks noChangeAspect="1"/>
-          </p:cNvPicPr>
-          <p:nvPr/>
-        </p:nvPicPr>
-        <p:blipFill>
-          <a:blip r:embed="rId2">
-            <a:extLst>
-              <a:ext uri="{28A0092B-C50C-407E-A947-70E740481C1C}">
-                <a14:useLocalDpi xmlns:a14="http://schemas.microsoft.com/office/drawing/2010/main" val="0"/>
-              </a:ext>
-            </a:extLst>
-          </a:blip>
-          <a:stretch>
-            <a:fillRect/>
-          </a:stretch>
-        </p:blipFill>
-        <p:spPr>
-          <a:xfrm>
-            <a:off x="1565840" y="813191"/>
-            <a:ext cx="9041270" cy="6260317"/>
-          </a:xfrm>
-          <a:prstGeom prst="rect">
-            <a:avLst/>
-          </a:prstGeom>
-        </p:spPr>
-      </p:pic>
-      <p:sp>
-        <p:nvSpPr>
-          <p:cNvPr id="7" name="Title 1">
-            <a:extLst>
-              <a:ext uri="{FF2B5EF4-FFF2-40B4-BE49-F238E27FC236}">
-                <a16:creationId xmlns:a16="http://schemas.microsoft.com/office/drawing/2014/main" id="{76D229D4-A06A-4607-AF1A-5232FEE40437}"/>
-              </a:ext>
-            </a:extLst>
-          </p:cNvPr>
-          <p:cNvSpPr>
-            <a:spLocks noGrp="1"/>
-          </p:cNvSpPr>
-          <p:nvPr>
-            <p:ph type="title"/>
-          </p:nvPr>
-        </p:nvSpPr>
-        <p:spPr>
-          <a:xfrm>
-            <a:off x="1274760" y="-584004"/>
-            <a:ext cx="10018713" cy="1752599"/>
-          </a:xfrm>
-        </p:spPr>
-        <p:txBody>
-          <a:bodyPr/>
-          <a:lstStyle/>
-          <a:p>
-            <a:r>
-              <a:rPr lang="ro-RO" dirty="0"/>
-              <a:t>Parcurgere de tip </a:t>
-            </a:r>
-            <a:r>
-              <a:rPr lang="ro-RO" dirty="0" err="1"/>
-              <a:t>breadth-first</a:t>
-            </a:r>
-            <a:endParaRPr lang="en-US" dirty="0"/>
-          </a:p>
-        </p:txBody>
-      </p:sp>
-    </p:spTree>
-    <p:extLst>
-      <p:ext uri="{BB962C8B-B14F-4D97-AF65-F5344CB8AC3E}">
-        <p14:creationId xmlns:p14="http://schemas.microsoft.com/office/powerpoint/2010/main" val="4182766361"/>
       </p:ext>
     </p:extLst>
   </p:cSld>
@@ -11906,6 +14322,164 @@
           </a:p>
         </p:txBody>
       </p:sp>
+      <p:pic>
+        <p:nvPicPr>
+          <p:cNvPr id="5" name="Picture 4" descr="A screenshot of a cell phone&#10;&#10;Description generated with very high confidence">
+            <a:extLst>
+              <a:ext uri="{FF2B5EF4-FFF2-40B4-BE49-F238E27FC236}">
+                <a16:creationId xmlns:a16="http://schemas.microsoft.com/office/drawing/2014/main" id="{81B41BE1-1BF9-4169-9FAD-2DBE7F4D0C00}"/>
+              </a:ext>
+            </a:extLst>
+          </p:cNvPr>
+          <p:cNvPicPr>
+            <a:picLocks noChangeAspect="1"/>
+          </p:cNvPicPr>
+          <p:nvPr/>
+        </p:nvPicPr>
+        <p:blipFill>
+          <a:blip r:embed="rId2">
+            <a:extLst>
+              <a:ext uri="{28A0092B-C50C-407E-A947-70E740481C1C}">
+                <a14:useLocalDpi xmlns:a14="http://schemas.microsoft.com/office/drawing/2010/main" val="0"/>
+              </a:ext>
+            </a:extLst>
+          </a:blip>
+          <a:stretch>
+            <a:fillRect/>
+          </a:stretch>
+        </p:blipFill>
+        <p:spPr>
+          <a:xfrm>
+            <a:off x="1565840" y="813191"/>
+            <a:ext cx="9041270" cy="6260317"/>
+          </a:xfrm>
+          <a:prstGeom prst="rect">
+            <a:avLst/>
+          </a:prstGeom>
+        </p:spPr>
+      </p:pic>
+      <p:sp>
+        <p:nvSpPr>
+          <p:cNvPr id="7" name="Title 1">
+            <a:extLst>
+              <a:ext uri="{FF2B5EF4-FFF2-40B4-BE49-F238E27FC236}">
+                <a16:creationId xmlns:a16="http://schemas.microsoft.com/office/drawing/2014/main" id="{76D229D4-A06A-4607-AF1A-5232FEE40437}"/>
+              </a:ext>
+            </a:extLst>
+          </p:cNvPr>
+          <p:cNvSpPr>
+            <a:spLocks noGrp="1"/>
+          </p:cNvSpPr>
+          <p:nvPr>
+            <p:ph type="title"/>
+          </p:nvPr>
+        </p:nvSpPr>
+        <p:spPr>
+          <a:xfrm>
+            <a:off x="1274760" y="-584004"/>
+            <a:ext cx="10018713" cy="1752599"/>
+          </a:xfrm>
+        </p:spPr>
+        <p:txBody>
+          <a:bodyPr/>
+          <a:lstStyle/>
+          <a:p>
+            <a:r>
+              <a:rPr lang="ro-RO" dirty="0"/>
+              <a:t>Parcurgere de tip </a:t>
+            </a:r>
+            <a:r>
+              <a:rPr lang="ro-RO" dirty="0" err="1"/>
+              <a:t>breadth-first</a:t>
+            </a:r>
+            <a:endParaRPr lang="en-US" dirty="0"/>
+          </a:p>
+        </p:txBody>
+      </p:sp>
+    </p:spTree>
+    <p:extLst>
+      <p:ext uri="{BB962C8B-B14F-4D97-AF65-F5344CB8AC3E}">
+        <p14:creationId xmlns:p14="http://schemas.microsoft.com/office/powerpoint/2010/main" val="4182766361"/>
+      </p:ext>
+    </p:extLst>
+  </p:cSld>
+  <p:clrMapOvr>
+    <a:masterClrMapping/>
+  </p:clrMapOvr>
+</p:sld>
+</file>
+
+<file path=ppt/slides/slide26.xml><?xml version="1.0" encoding="utf-8"?>
+<p:sld xmlns:a="http://schemas.openxmlformats.org/drawingml/2006/main" xmlns:r="http://schemas.openxmlformats.org/officeDocument/2006/relationships" xmlns:p="http://schemas.openxmlformats.org/presentationml/2006/main">
+  <p:cSld>
+    <p:spTree>
+      <p:nvGrpSpPr>
+        <p:cNvPr id="1" name=""/>
+        <p:cNvGrpSpPr/>
+        <p:nvPr/>
+      </p:nvGrpSpPr>
+      <p:grpSpPr>
+        <a:xfrm>
+          <a:off x="0" y="0"/>
+          <a:ext cx="0" cy="0"/>
+          <a:chOff x="0" y="0"/>
+          <a:chExt cx="0" cy="0"/>
+        </a:xfrm>
+      </p:grpSpPr>
+      <p:sp>
+        <p:nvSpPr>
+          <p:cNvPr id="6" name="Rectangle 5">
+            <a:extLst>
+              <a:ext uri="{FF2B5EF4-FFF2-40B4-BE49-F238E27FC236}">
+                <a16:creationId xmlns:a16="http://schemas.microsoft.com/office/drawing/2014/main" id="{191B9577-3A97-4821-91EA-83278043652F}"/>
+              </a:ext>
+            </a:extLst>
+          </p:cNvPr>
+          <p:cNvSpPr/>
+          <p:nvPr/>
+        </p:nvSpPr>
+        <p:spPr>
+          <a:xfrm>
+            <a:off x="-228600" y="-228600"/>
+            <a:ext cx="12630150" cy="7448550"/>
+          </a:xfrm>
+          <a:prstGeom prst="rect">
+            <a:avLst/>
+          </a:prstGeom>
+          <a:solidFill>
+            <a:schemeClr val="bg1"/>
+          </a:solidFill>
+          <a:ln>
+            <a:solidFill>
+              <a:schemeClr val="bg1"/>
+            </a:solidFill>
+          </a:ln>
+        </p:spPr>
+        <p:style>
+          <a:lnRef idx="2">
+            <a:schemeClr val="accent1">
+              <a:shade val="50000"/>
+            </a:schemeClr>
+          </a:lnRef>
+          <a:fillRef idx="1">
+            <a:schemeClr val="accent1"/>
+          </a:fillRef>
+          <a:effectRef idx="0">
+            <a:schemeClr val="accent1"/>
+          </a:effectRef>
+          <a:fontRef idx="minor">
+            <a:schemeClr val="lt1"/>
+          </a:fontRef>
+        </p:style>
+        <p:txBody>
+          <a:bodyPr rtlCol="0" anchor="ctr"/>
+          <a:lstStyle/>
+          <a:p>
+            <a:pPr algn="ctr"/>
+            <a:endParaRPr lang="en-US"/>
+          </a:p>
+        </p:txBody>
+      </p:sp>
       <p:sp>
         <p:nvSpPr>
           <p:cNvPr id="4" name="Title 1">
@@ -11993,7 +14567,7 @@
 </p:sld>
 </file>
 
-<file path=ppt/slides/slide26.xml><?xml version="1.0" encoding="utf-8"?>
+<file path=ppt/slides/slide27.xml><?xml version="1.0" encoding="utf-8"?>
 <p:sld xmlns:a="http://schemas.openxmlformats.org/drawingml/2006/main" xmlns:r="http://schemas.openxmlformats.org/officeDocument/2006/relationships" xmlns:p="http://schemas.openxmlformats.org/presentationml/2006/main">
   <p:cSld>
     <p:spTree>
@@ -12287,7 +14861,7 @@
 </p:sld>
 </file>
 
-<file path=ppt/slides/slide27.xml><?xml version="1.0" encoding="utf-8"?>
+<file path=ppt/slides/slide28.xml><?xml version="1.0" encoding="utf-8"?>
 <p:sld xmlns:a="http://schemas.openxmlformats.org/drawingml/2006/main" xmlns:r="http://schemas.openxmlformats.org/officeDocument/2006/relationships" xmlns:p="http://schemas.openxmlformats.org/presentationml/2006/main">
   <p:cSld>
     <p:spTree>
@@ -12449,7 +15023,7 @@
 </p:sld>
 </file>
 
-<file path=ppt/slides/slide28.xml><?xml version="1.0" encoding="utf-8"?>
+<file path=ppt/slides/slide29.xml><?xml version="1.0" encoding="utf-8"?>
 <p:sld xmlns:a="http://schemas.openxmlformats.org/drawingml/2006/main" xmlns:r="http://schemas.openxmlformats.org/officeDocument/2006/relationships" xmlns:p="http://schemas.openxmlformats.org/presentationml/2006/main">
   <p:cSld>
     <p:spTree>
@@ -12569,107 +15143,6 @@
     <p:extLst>
       <p:ext uri="{BB962C8B-B14F-4D97-AF65-F5344CB8AC3E}">
         <p14:creationId xmlns:p14="http://schemas.microsoft.com/office/powerpoint/2010/main" val="2874104391"/>
-      </p:ext>
-    </p:extLst>
-  </p:cSld>
-  <p:clrMapOvr>
-    <a:masterClrMapping/>
-  </p:clrMapOvr>
-</p:sld>
-</file>
-
-<file path=ppt/slides/slide29.xml><?xml version="1.0" encoding="utf-8"?>
-<p:sld xmlns:a="http://schemas.openxmlformats.org/drawingml/2006/main" xmlns:r="http://schemas.openxmlformats.org/officeDocument/2006/relationships" xmlns:p="http://schemas.openxmlformats.org/presentationml/2006/main">
-  <p:cSld>
-    <p:spTree>
-      <p:nvGrpSpPr>
-        <p:cNvPr id="1" name=""/>
-        <p:cNvGrpSpPr/>
-        <p:nvPr/>
-      </p:nvGrpSpPr>
-      <p:grpSpPr>
-        <a:xfrm>
-          <a:off x="0" y="0"/>
-          <a:ext cx="0" cy="0"/>
-          <a:chOff x="0" y="0"/>
-          <a:chExt cx="0" cy="0"/>
-        </a:xfrm>
-      </p:grpSpPr>
-      <p:sp>
-        <p:nvSpPr>
-          <p:cNvPr id="2" name="Title 1">
-            <a:extLst>
-              <a:ext uri="{FF2B5EF4-FFF2-40B4-BE49-F238E27FC236}">
-                <a16:creationId xmlns:a16="http://schemas.microsoft.com/office/drawing/2014/main" id="{D4E68C8C-4B5D-455E-A163-7703F41147B6}"/>
-              </a:ext>
-            </a:extLst>
-          </p:cNvPr>
-          <p:cNvSpPr>
-            <a:spLocks noGrp="1"/>
-          </p:cNvSpPr>
-          <p:nvPr>
-            <p:ph type="title"/>
-          </p:nvPr>
-        </p:nvSpPr>
-        <p:spPr/>
-        <p:txBody>
-          <a:bodyPr/>
-          <a:lstStyle/>
-          <a:p>
-            <a:r>
-              <a:rPr lang="ro-RO" dirty="0"/>
-              <a:t>Sistem de notificări</a:t>
-            </a:r>
-            <a:endParaRPr lang="en-US" dirty="0"/>
-          </a:p>
-        </p:txBody>
-      </p:sp>
-      <p:sp>
-        <p:nvSpPr>
-          <p:cNvPr id="3" name="Content Placeholder 2">
-            <a:extLst>
-              <a:ext uri="{FF2B5EF4-FFF2-40B4-BE49-F238E27FC236}">
-                <a16:creationId xmlns:a16="http://schemas.microsoft.com/office/drawing/2014/main" id="{5354835D-731A-4D6E-AB1E-6F241E8735F4}"/>
-              </a:ext>
-            </a:extLst>
-          </p:cNvPr>
-          <p:cNvSpPr>
-            <a:spLocks noGrp="1"/>
-          </p:cNvSpPr>
-          <p:nvPr>
-            <p:ph idx="1"/>
-          </p:nvPr>
-        </p:nvSpPr>
-        <p:spPr/>
-        <p:txBody>
-          <a:bodyPr/>
-          <a:lstStyle/>
-          <a:p>
-            <a:r>
-              <a:rPr lang="ro-RO" dirty="0"/>
-              <a:t>Email</a:t>
-            </a:r>
-          </a:p>
-          <a:p>
-            <a:r>
-              <a:rPr lang="ro-RO" dirty="0" err="1"/>
-              <a:t>Push</a:t>
-            </a:r>
-            <a:endParaRPr lang="ro-RO" dirty="0"/>
-          </a:p>
-          <a:p>
-            <a:r>
-              <a:rPr lang="ro-RO" dirty="0"/>
-              <a:t>Subscripții</a:t>
-            </a:r>
-            <a:endParaRPr lang="en-US" dirty="0"/>
-          </a:p>
-        </p:txBody>
-      </p:sp>
-    </p:spTree>
-    <p:extLst>
-      <p:ext uri="{BB962C8B-B14F-4D97-AF65-F5344CB8AC3E}">
-        <p14:creationId xmlns:p14="http://schemas.microsoft.com/office/powerpoint/2010/main" val="624289095"/>
       </p:ext>
     </p:extLst>
   </p:cSld>
@@ -12783,6 +15256,107 @@
       </p:grpSpPr>
       <p:sp>
         <p:nvSpPr>
+          <p:cNvPr id="2" name="Title 1">
+            <a:extLst>
+              <a:ext uri="{FF2B5EF4-FFF2-40B4-BE49-F238E27FC236}">
+                <a16:creationId xmlns:a16="http://schemas.microsoft.com/office/drawing/2014/main" id="{D4E68C8C-4B5D-455E-A163-7703F41147B6}"/>
+              </a:ext>
+            </a:extLst>
+          </p:cNvPr>
+          <p:cNvSpPr>
+            <a:spLocks noGrp="1"/>
+          </p:cNvSpPr>
+          <p:nvPr>
+            <p:ph type="title"/>
+          </p:nvPr>
+        </p:nvSpPr>
+        <p:spPr/>
+        <p:txBody>
+          <a:bodyPr/>
+          <a:lstStyle/>
+          <a:p>
+            <a:r>
+              <a:rPr lang="ro-RO" dirty="0"/>
+              <a:t>Sistem de notificări</a:t>
+            </a:r>
+            <a:endParaRPr lang="en-US" dirty="0"/>
+          </a:p>
+        </p:txBody>
+      </p:sp>
+      <p:sp>
+        <p:nvSpPr>
+          <p:cNvPr id="3" name="Content Placeholder 2">
+            <a:extLst>
+              <a:ext uri="{FF2B5EF4-FFF2-40B4-BE49-F238E27FC236}">
+                <a16:creationId xmlns:a16="http://schemas.microsoft.com/office/drawing/2014/main" id="{5354835D-731A-4D6E-AB1E-6F241E8735F4}"/>
+              </a:ext>
+            </a:extLst>
+          </p:cNvPr>
+          <p:cNvSpPr>
+            <a:spLocks noGrp="1"/>
+          </p:cNvSpPr>
+          <p:nvPr>
+            <p:ph idx="1"/>
+          </p:nvPr>
+        </p:nvSpPr>
+        <p:spPr/>
+        <p:txBody>
+          <a:bodyPr/>
+          <a:lstStyle/>
+          <a:p>
+            <a:r>
+              <a:rPr lang="ro-RO" dirty="0"/>
+              <a:t>Email</a:t>
+            </a:r>
+          </a:p>
+          <a:p>
+            <a:r>
+              <a:rPr lang="ro-RO" dirty="0" err="1"/>
+              <a:t>Push</a:t>
+            </a:r>
+            <a:endParaRPr lang="ro-RO" dirty="0"/>
+          </a:p>
+          <a:p>
+            <a:r>
+              <a:rPr lang="ro-RO" dirty="0"/>
+              <a:t>Subscripții</a:t>
+            </a:r>
+            <a:endParaRPr lang="en-US" dirty="0"/>
+          </a:p>
+        </p:txBody>
+      </p:sp>
+    </p:spTree>
+    <p:extLst>
+      <p:ext uri="{BB962C8B-B14F-4D97-AF65-F5344CB8AC3E}">
+        <p14:creationId xmlns:p14="http://schemas.microsoft.com/office/powerpoint/2010/main" val="624289095"/>
+      </p:ext>
+    </p:extLst>
+  </p:cSld>
+  <p:clrMapOvr>
+    <a:masterClrMapping/>
+  </p:clrMapOvr>
+</p:sld>
+</file>
+
+<file path=ppt/slides/slide31.xml><?xml version="1.0" encoding="utf-8"?>
+<p:sld xmlns:a="http://schemas.openxmlformats.org/drawingml/2006/main" xmlns:r="http://schemas.openxmlformats.org/officeDocument/2006/relationships" xmlns:p="http://schemas.openxmlformats.org/presentationml/2006/main">
+  <p:cSld>
+    <p:spTree>
+      <p:nvGrpSpPr>
+        <p:cNvPr id="1" name=""/>
+        <p:cNvGrpSpPr/>
+        <p:nvPr/>
+      </p:nvGrpSpPr>
+      <p:grpSpPr>
+        <a:xfrm>
+          <a:off x="0" y="0"/>
+          <a:ext cx="0" cy="0"/>
+          <a:chOff x="0" y="0"/>
+          <a:chExt cx="0" cy="0"/>
+        </a:xfrm>
+      </p:grpSpPr>
+      <p:sp>
+        <p:nvSpPr>
           <p:cNvPr id="3" name="Content Placeholder 2">
             <a:extLst>
               <a:ext uri="{FF2B5EF4-FFF2-40B4-BE49-F238E27FC236}">
@@ -13102,7 +15676,7 @@
 </p:sld>
 </file>
 
-<file path=ppt/slides/slide31.xml><?xml version="1.0" encoding="utf-8"?>
+<file path=ppt/slides/slide32.xml><?xml version="1.0" encoding="utf-8"?>
 <p:sld xmlns:a="http://schemas.openxmlformats.org/drawingml/2006/main" xmlns:r="http://schemas.openxmlformats.org/officeDocument/2006/relationships" xmlns:p="http://schemas.openxmlformats.org/presentationml/2006/main">
   <p:cSld>
     <p:spTree>
@@ -13225,7 +15799,7 @@
 </p:sld>
 </file>
 
-<file path=ppt/slides/slide32.xml><?xml version="1.0" encoding="utf-8"?>
+<file path=ppt/slides/slide33.xml><?xml version="1.0" encoding="utf-8"?>
 <p:sld xmlns:a="http://schemas.openxmlformats.org/drawingml/2006/main" xmlns:r="http://schemas.openxmlformats.org/officeDocument/2006/relationships" xmlns:p="http://schemas.openxmlformats.org/presentationml/2006/main">
   <p:cSld>
     <p:spTree>
@@ -13582,7 +16156,7 @@
 </p:sld>
 </file>
 
-<file path=ppt/slides/slide33.xml><?xml version="1.0" encoding="utf-8"?>
+<file path=ppt/slides/slide34.xml><?xml version="1.0" encoding="utf-8"?>
 <p:sld xmlns:a="http://schemas.openxmlformats.org/drawingml/2006/main" xmlns:r="http://schemas.openxmlformats.org/officeDocument/2006/relationships" xmlns:p="http://schemas.openxmlformats.org/presentationml/2006/main">
   <p:cSld>
     <p:spTree>

</xml_diff>